<commit_message>
final-ish draft of the hbc paper and with the tables adjusted a bit
</commit_message>
<xml_diff>
--- a/hbc_paper/figures/schematics_hbcpaper.pptx
+++ b/hbc_paper/figures/schematics_hbcpaper.pptx
@@ -105,6 +105,11 @@
       </a:defRPr>
     </a:lvl9pPr>
   </p:defaultTextStyle>
+  <p:extLst>
+    <p:ext uri="{EFAFB233-063F-42B5-8137-9DF3F51BA10A}">
+      <p15:sldGuideLst xmlns:p15="http://schemas.microsoft.com/office/powerpoint/2012/main"/>
+    </p:ext>
+  </p:extLst>
 </p:presentation>
 </file>
 
@@ -257,7 +262,7 @@
           <a:p>
             <a:fld id="{282298F1-C911-427F-A662-45721A4CC261}" type="datetimeFigureOut">
               <a:rPr lang="en-DE" smtClean="0"/>
-              <a:t>19/12/2020</a:t>
+              <a:t>28/12/2020</a:t>
             </a:fld>
             <a:endParaRPr lang="en-DE"/>
           </a:p>
@@ -457,7 +462,7 @@
           <a:p>
             <a:fld id="{282298F1-C911-427F-A662-45721A4CC261}" type="datetimeFigureOut">
               <a:rPr lang="en-DE" smtClean="0"/>
-              <a:t>19/12/2020</a:t>
+              <a:t>28/12/2020</a:t>
             </a:fld>
             <a:endParaRPr lang="en-DE"/>
           </a:p>
@@ -667,7 +672,7 @@
           <a:p>
             <a:fld id="{282298F1-C911-427F-A662-45721A4CC261}" type="datetimeFigureOut">
               <a:rPr lang="en-DE" smtClean="0"/>
-              <a:t>19/12/2020</a:t>
+              <a:t>28/12/2020</a:t>
             </a:fld>
             <a:endParaRPr lang="en-DE"/>
           </a:p>
@@ -867,7 +872,7 @@
           <a:p>
             <a:fld id="{282298F1-C911-427F-A662-45721A4CC261}" type="datetimeFigureOut">
               <a:rPr lang="en-DE" smtClean="0"/>
-              <a:t>19/12/2020</a:t>
+              <a:t>28/12/2020</a:t>
             </a:fld>
             <a:endParaRPr lang="en-DE"/>
           </a:p>
@@ -1143,7 +1148,7 @@
           <a:p>
             <a:fld id="{282298F1-C911-427F-A662-45721A4CC261}" type="datetimeFigureOut">
               <a:rPr lang="en-DE" smtClean="0"/>
-              <a:t>19/12/2020</a:t>
+              <a:t>28/12/2020</a:t>
             </a:fld>
             <a:endParaRPr lang="en-DE"/>
           </a:p>
@@ -1411,7 +1416,7 @@
           <a:p>
             <a:fld id="{282298F1-C911-427F-A662-45721A4CC261}" type="datetimeFigureOut">
               <a:rPr lang="en-DE" smtClean="0"/>
-              <a:t>19/12/2020</a:t>
+              <a:t>28/12/2020</a:t>
             </a:fld>
             <a:endParaRPr lang="en-DE"/>
           </a:p>
@@ -1826,7 +1831,7 @@
           <a:p>
             <a:fld id="{282298F1-C911-427F-A662-45721A4CC261}" type="datetimeFigureOut">
               <a:rPr lang="en-DE" smtClean="0"/>
-              <a:t>19/12/2020</a:t>
+              <a:t>28/12/2020</a:t>
             </a:fld>
             <a:endParaRPr lang="en-DE"/>
           </a:p>
@@ -1968,7 +1973,7 @@
           <a:p>
             <a:fld id="{282298F1-C911-427F-A662-45721A4CC261}" type="datetimeFigureOut">
               <a:rPr lang="en-DE" smtClean="0"/>
-              <a:t>19/12/2020</a:t>
+              <a:t>28/12/2020</a:t>
             </a:fld>
             <a:endParaRPr lang="en-DE"/>
           </a:p>
@@ -2081,7 +2086,7 @@
           <a:p>
             <a:fld id="{282298F1-C911-427F-A662-45721A4CC261}" type="datetimeFigureOut">
               <a:rPr lang="en-DE" smtClean="0"/>
-              <a:t>19/12/2020</a:t>
+              <a:t>28/12/2020</a:t>
             </a:fld>
             <a:endParaRPr lang="en-DE"/>
           </a:p>
@@ -2394,7 +2399,7 @@
           <a:p>
             <a:fld id="{282298F1-C911-427F-A662-45721A4CC261}" type="datetimeFigureOut">
               <a:rPr lang="en-DE" smtClean="0"/>
-              <a:t>19/12/2020</a:t>
+              <a:t>28/12/2020</a:t>
             </a:fld>
             <a:endParaRPr lang="en-DE"/>
           </a:p>
@@ -2683,7 +2688,7 @@
           <a:p>
             <a:fld id="{282298F1-C911-427F-A662-45721A4CC261}" type="datetimeFigureOut">
               <a:rPr lang="en-DE" smtClean="0"/>
-              <a:t>19/12/2020</a:t>
+              <a:t>28/12/2020</a:t>
             </a:fld>
             <a:endParaRPr lang="en-DE"/>
           </a:p>
@@ -2926,7 +2931,7 @@
           <a:p>
             <a:fld id="{282298F1-C911-427F-A662-45721A4CC261}" type="datetimeFigureOut">
               <a:rPr lang="en-DE" smtClean="0"/>
-              <a:t>19/12/2020</a:t>
+              <a:t>28/12/2020</a:t>
             </a:fld>
             <a:endParaRPr lang="en-DE"/>
           </a:p>
@@ -5138,6 +5143,1665 @@
           <a:chExt cx="0" cy="0"/>
         </a:xfrm>
       </p:grpSpPr>
+      <p:sp>
+        <p:nvSpPr>
+          <p:cNvPr id="13" name="TextBox 12">
+            <a:extLst>
+              <a:ext uri="{FF2B5EF4-FFF2-40B4-BE49-F238E27FC236}">
+                <a16:creationId xmlns:a16="http://schemas.microsoft.com/office/drawing/2014/main" id="{C5AD0799-5D4D-4D57-98AD-FB58A3847DDF}"/>
+              </a:ext>
+            </a:extLst>
+          </p:cNvPr>
+          <p:cNvSpPr txBox="1"/>
+          <p:nvPr/>
+        </p:nvSpPr>
+        <p:spPr>
+          <a:xfrm>
+            <a:off x="6798004" y="633260"/>
+            <a:ext cx="223190" cy="369332"/>
+          </a:xfrm>
+          <a:prstGeom prst="rect">
+            <a:avLst/>
+          </a:prstGeom>
+          <a:noFill/>
+        </p:spPr>
+        <p:txBody>
+          <a:bodyPr wrap="square" rtlCol="0">
+            <a:spAutoFit/>
+          </a:bodyPr>
+          <a:lstStyle/>
+          <a:p>
+            <a:r>
+              <a:rPr lang="en-US" dirty="0"/>
+              <a:t>1</a:t>
+            </a:r>
+            <a:endParaRPr lang="en-DE" dirty="0"/>
+          </a:p>
+        </p:txBody>
+      </p:sp>
+      <p:sp>
+        <p:nvSpPr>
+          <p:cNvPr id="14" name="TextBox 13">
+            <a:extLst>
+              <a:ext uri="{FF2B5EF4-FFF2-40B4-BE49-F238E27FC236}">
+                <a16:creationId xmlns:a16="http://schemas.microsoft.com/office/drawing/2014/main" id="{AD2E4D3F-725B-4E69-A6B1-4D39A57BA837}"/>
+              </a:ext>
+            </a:extLst>
+          </p:cNvPr>
+          <p:cNvSpPr txBox="1"/>
+          <p:nvPr/>
+        </p:nvSpPr>
+        <p:spPr>
+          <a:xfrm>
+            <a:off x="5145611" y="1220297"/>
+            <a:ext cx="223190" cy="369332"/>
+          </a:xfrm>
+          <a:prstGeom prst="rect">
+            <a:avLst/>
+          </a:prstGeom>
+          <a:noFill/>
+        </p:spPr>
+        <p:txBody>
+          <a:bodyPr wrap="square" rtlCol="0">
+            <a:spAutoFit/>
+          </a:bodyPr>
+          <a:lstStyle/>
+          <a:p>
+            <a:r>
+              <a:rPr lang="en-US" dirty="0"/>
+              <a:t>2</a:t>
+            </a:r>
+            <a:endParaRPr lang="en-DE" dirty="0"/>
+          </a:p>
+        </p:txBody>
+      </p:sp>
+      <p:sp>
+        <p:nvSpPr>
+          <p:cNvPr id="15" name="TextBox 14">
+            <a:extLst>
+              <a:ext uri="{FF2B5EF4-FFF2-40B4-BE49-F238E27FC236}">
+                <a16:creationId xmlns:a16="http://schemas.microsoft.com/office/drawing/2014/main" id="{9D2E57CF-2137-45AD-99FF-DDECCED894B5}"/>
+              </a:ext>
+            </a:extLst>
+          </p:cNvPr>
+          <p:cNvSpPr txBox="1"/>
+          <p:nvPr/>
+        </p:nvSpPr>
+        <p:spPr>
+          <a:xfrm>
+            <a:off x="5916635" y="1984466"/>
+            <a:ext cx="223190" cy="369332"/>
+          </a:xfrm>
+          <a:prstGeom prst="rect">
+            <a:avLst/>
+          </a:prstGeom>
+          <a:noFill/>
+        </p:spPr>
+        <p:txBody>
+          <a:bodyPr wrap="square" rtlCol="0">
+            <a:spAutoFit/>
+          </a:bodyPr>
+          <a:lstStyle/>
+          <a:p>
+            <a:r>
+              <a:rPr lang="en-US" dirty="0"/>
+              <a:t>3</a:t>
+            </a:r>
+            <a:endParaRPr lang="en-DE" dirty="0"/>
+          </a:p>
+        </p:txBody>
+      </p:sp>
+      <p:grpSp>
+        <p:nvGrpSpPr>
+          <p:cNvPr id="19" name="Group 18">
+            <a:extLst>
+              <a:ext uri="{FF2B5EF4-FFF2-40B4-BE49-F238E27FC236}">
+                <a16:creationId xmlns:a16="http://schemas.microsoft.com/office/drawing/2014/main" id="{E0D91AEE-12F5-4C28-AF42-B5EF2F99B9C5}"/>
+              </a:ext>
+            </a:extLst>
+          </p:cNvPr>
+          <p:cNvGrpSpPr/>
+          <p:nvPr/>
+        </p:nvGrpSpPr>
+        <p:grpSpPr>
+          <a:xfrm>
+            <a:off x="0" y="-1"/>
+            <a:ext cx="8436868" cy="3542805"/>
+            <a:chOff x="0" y="-1"/>
+            <a:chExt cx="8436868" cy="3542805"/>
+          </a:xfrm>
+        </p:grpSpPr>
+        <p:pic>
+          <p:nvPicPr>
+            <p:cNvPr id="3" name="Picture 2">
+              <a:extLst>
+                <a:ext uri="{FF2B5EF4-FFF2-40B4-BE49-F238E27FC236}">
+                  <a16:creationId xmlns:a16="http://schemas.microsoft.com/office/drawing/2014/main" id="{39C6C987-4807-420E-BC5A-1C809FA88123}"/>
+                </a:ext>
+              </a:extLst>
+            </p:cNvPr>
+            <p:cNvPicPr>
+              <a:picLocks noChangeAspect="1"/>
+            </p:cNvPicPr>
+            <p:nvPr/>
+          </p:nvPicPr>
+          <p:blipFill>
+            <a:blip r:embed="rId2">
+              <a:extLst>
+                <a:ext uri="{28A0092B-C50C-407E-A947-70E740481C1C}">
+                  <a14:useLocalDpi xmlns:a14="http://schemas.microsoft.com/office/drawing/2010/main" val="0"/>
+                </a:ext>
+              </a:extLst>
+            </a:blip>
+            <a:stretch>
+              <a:fillRect/>
+            </a:stretch>
+          </p:blipFill>
+          <p:spPr>
+            <a:xfrm>
+              <a:off x="0" y="0"/>
+              <a:ext cx="3928857" cy="3345425"/>
+            </a:xfrm>
+            <a:prstGeom prst="rect">
+              <a:avLst/>
+            </a:prstGeom>
+          </p:spPr>
+        </p:pic>
+        <p:grpSp>
+          <p:nvGrpSpPr>
+            <p:cNvPr id="4" name="Group 3">
+              <a:extLst>
+                <a:ext uri="{FF2B5EF4-FFF2-40B4-BE49-F238E27FC236}">
+                  <a16:creationId xmlns:a16="http://schemas.microsoft.com/office/drawing/2014/main" id="{68225E6A-C70E-49A5-B560-2316EC3C46C6}"/>
+                </a:ext>
+              </a:extLst>
+            </p:cNvPr>
+            <p:cNvGrpSpPr/>
+            <p:nvPr/>
+          </p:nvGrpSpPr>
+          <p:grpSpPr>
+            <a:xfrm rot="17409571">
+              <a:off x="4621626" y="62820"/>
+              <a:ext cx="3505294" cy="3454673"/>
+              <a:chOff x="1547703" y="24707228"/>
+              <a:chExt cx="4270448" cy="4013786"/>
+            </a:xfrm>
+          </p:grpSpPr>
+          <p:grpSp>
+            <p:nvGrpSpPr>
+              <p:cNvPr id="5" name="Group 4">
+                <a:extLst>
+                  <a:ext uri="{FF2B5EF4-FFF2-40B4-BE49-F238E27FC236}">
+                    <a16:creationId xmlns:a16="http://schemas.microsoft.com/office/drawing/2014/main" id="{9204E163-C496-4E11-AF71-AFA0607D6E50}"/>
+                  </a:ext>
+                </a:extLst>
+              </p:cNvPr>
+              <p:cNvGrpSpPr/>
+              <p:nvPr/>
+            </p:nvGrpSpPr>
+            <p:grpSpPr>
+              <a:xfrm>
+                <a:off x="1547703" y="24707228"/>
+                <a:ext cx="4270448" cy="4013786"/>
+                <a:chOff x="14098" y="23718189"/>
+                <a:chExt cx="4248150" cy="3992828"/>
+              </a:xfrm>
+            </p:grpSpPr>
+            <p:pic>
+              <p:nvPicPr>
+                <p:cNvPr id="7" name="Picture 6">
+                  <a:extLst>
+                    <a:ext uri="{FF2B5EF4-FFF2-40B4-BE49-F238E27FC236}">
+                      <a16:creationId xmlns:a16="http://schemas.microsoft.com/office/drawing/2014/main" id="{93F745AF-893D-49D4-9A0A-E17357E649BB}"/>
+                    </a:ext>
+                  </a:extLst>
+                </p:cNvPr>
+                <p:cNvPicPr>
+                  <a:picLocks noChangeAspect="1" noChangeArrowheads="1"/>
+                </p:cNvPicPr>
+                <p:nvPr/>
+              </p:nvPicPr>
+              <p:blipFill rotWithShape="1">
+                <a:blip r:embed="rId3">
+                  <a:extLst>
+                    <a:ext uri="{28A0092B-C50C-407E-A947-70E740481C1C}">
+                      <a14:useLocalDpi xmlns:a14="http://schemas.microsoft.com/office/drawing/2010/main" val="0"/>
+                    </a:ext>
+                  </a:extLst>
+                </a:blip>
+                <a:srcRect t="15768" b="12330"/>
+                <a:stretch/>
+              </p:blipFill>
+              <p:spPr bwMode="auto">
+                <a:xfrm>
+                  <a:off x="14098" y="23718189"/>
+                  <a:ext cx="4248150" cy="3992828"/>
+                </a:xfrm>
+                <a:prstGeom prst="rect">
+                  <a:avLst/>
+                </a:prstGeom>
+                <a:noFill/>
+                <a:ln>
+                  <a:noFill/>
+                </a:ln>
+                <a:extLst>
+                  <a:ext uri="{909E8E84-426E-40DD-AFC4-6F175D3DCCD1}">
+                    <a14:hiddenFill xmlns:a14="http://schemas.microsoft.com/office/drawing/2010/main">
+                      <a:solidFill>
+                        <a:schemeClr val="accent1"/>
+                      </a:solidFill>
+                    </a14:hiddenFill>
+                  </a:ext>
+                  <a:ext uri="{91240B29-F687-4F45-9708-019B960494DF}">
+                    <a14:hiddenLine xmlns:a14="http://schemas.microsoft.com/office/drawing/2010/main" w="9525">
+                      <a:solidFill>
+                        <a:schemeClr val="tx1"/>
+                      </a:solidFill>
+                      <a:miter lim="800000"/>
+                      <a:headEnd/>
+                      <a:tailEnd/>
+                    </a14:hiddenLine>
+                  </a:ext>
+                </a:extLst>
+              </p:spPr>
+            </p:pic>
+            <p:pic>
+              <p:nvPicPr>
+                <p:cNvPr id="8" name="Picture 7" descr="Image result for microphone cartoons">
+                  <a:extLst>
+                    <a:ext uri="{FF2B5EF4-FFF2-40B4-BE49-F238E27FC236}">
+                      <a16:creationId xmlns:a16="http://schemas.microsoft.com/office/drawing/2014/main" id="{C43FDA7D-CCA8-4632-B7AC-EE389AFB914B}"/>
+                    </a:ext>
+                  </a:extLst>
+                </p:cNvPr>
+                <p:cNvPicPr>
+                  <a:picLocks noChangeAspect="1" noChangeArrowheads="1"/>
+                </p:cNvPicPr>
+                <p:nvPr/>
+              </p:nvPicPr>
+              <p:blipFill rotWithShape="1">
+                <a:blip r:embed="rId4" cstate="print">
+                  <a:extLst>
+                    <a:ext uri="{28A0092B-C50C-407E-A947-70E740481C1C}">
+                      <a14:useLocalDpi xmlns:a14="http://schemas.microsoft.com/office/drawing/2010/main" val="0"/>
+                    </a:ext>
+                  </a:extLst>
+                </a:blip>
+                <a:srcRect t="1" b="6705"/>
+                <a:stretch/>
+              </p:blipFill>
+              <p:spPr bwMode="auto">
+                <a:xfrm rot="3300000">
+                  <a:off x="1087105" y="24920630"/>
+                  <a:ext cx="415531" cy="516887"/>
+                </a:xfrm>
+                <a:prstGeom prst="rect">
+                  <a:avLst/>
+                </a:prstGeom>
+                <a:noFill/>
+                <a:extLst>
+                  <a:ext uri="{909E8E84-426E-40DD-AFC4-6F175D3DCCD1}">
+                    <a14:hiddenFill xmlns:a14="http://schemas.microsoft.com/office/drawing/2010/main">
+                      <a:solidFill>
+                        <a:srgbClr val="FFFFFF"/>
+                      </a:solidFill>
+                    </a14:hiddenFill>
+                  </a:ext>
+                </a:extLst>
+              </p:spPr>
+            </p:pic>
+            <p:pic>
+              <p:nvPicPr>
+                <p:cNvPr id="9" name="Picture 8" descr="Image result for microphone cartoons">
+                  <a:extLst>
+                    <a:ext uri="{FF2B5EF4-FFF2-40B4-BE49-F238E27FC236}">
+                      <a16:creationId xmlns:a16="http://schemas.microsoft.com/office/drawing/2014/main" id="{144AEDC1-0F71-4567-91D0-BAC468B01127}"/>
+                    </a:ext>
+                  </a:extLst>
+                </p:cNvPr>
+                <p:cNvPicPr>
+                  <a:picLocks noChangeAspect="1" noChangeArrowheads="1"/>
+                </p:cNvPicPr>
+                <p:nvPr/>
+              </p:nvPicPr>
+              <p:blipFill rotWithShape="1">
+                <a:blip r:embed="rId4" cstate="print">
+                  <a:extLst>
+                    <a:ext uri="{28A0092B-C50C-407E-A947-70E740481C1C}">
+                      <a14:useLocalDpi xmlns:a14="http://schemas.microsoft.com/office/drawing/2010/main" val="0"/>
+                    </a:ext>
+                  </a:extLst>
+                </a:blip>
+                <a:srcRect b="5662"/>
+                <a:stretch/>
+              </p:blipFill>
+              <p:spPr bwMode="auto">
+                <a:xfrm rot="-7380000">
+                  <a:off x="3221769" y="25275932"/>
+                  <a:ext cx="415531" cy="522669"/>
+                </a:xfrm>
+                <a:prstGeom prst="rect">
+                  <a:avLst/>
+                </a:prstGeom>
+                <a:noFill/>
+                <a:extLst>
+                  <a:ext uri="{909E8E84-426E-40DD-AFC4-6F175D3DCCD1}">
+                    <a14:hiddenFill xmlns:a14="http://schemas.microsoft.com/office/drawing/2010/main">
+                      <a:solidFill>
+                        <a:srgbClr val="FFFFFF"/>
+                      </a:solidFill>
+                    </a14:hiddenFill>
+                  </a:ext>
+                </a:extLst>
+              </p:spPr>
+            </p:pic>
+            <p:pic>
+              <p:nvPicPr>
+                <p:cNvPr id="10" name="Picture 9" descr="Image result for microphone cartoons">
+                  <a:extLst>
+                    <a:ext uri="{FF2B5EF4-FFF2-40B4-BE49-F238E27FC236}">
+                      <a16:creationId xmlns:a16="http://schemas.microsoft.com/office/drawing/2014/main" id="{87D7331D-8AED-49D0-B638-1FFF12FEAFB4}"/>
+                    </a:ext>
+                  </a:extLst>
+                </p:cNvPr>
+                <p:cNvPicPr>
+                  <a:picLocks noChangeAspect="1" noChangeArrowheads="1"/>
+                </p:cNvPicPr>
+                <p:nvPr/>
+              </p:nvPicPr>
+              <p:blipFill rotWithShape="1">
+                <a:blip r:embed="rId4" cstate="print">
+                  <a:extLst>
+                    <a:ext uri="{28A0092B-C50C-407E-A947-70E740481C1C}">
+                      <a14:useLocalDpi xmlns:a14="http://schemas.microsoft.com/office/drawing/2010/main" val="0"/>
+                    </a:ext>
+                  </a:extLst>
+                </a:blip>
+                <a:srcRect b="6339"/>
+                <a:stretch/>
+              </p:blipFill>
+              <p:spPr bwMode="auto">
+                <a:xfrm rot="1860000" flipV="1">
+                  <a:off x="2044458" y="24021492"/>
+                  <a:ext cx="415531" cy="518915"/>
+                </a:xfrm>
+                <a:prstGeom prst="rect">
+                  <a:avLst/>
+                </a:prstGeom>
+                <a:noFill/>
+                <a:extLst>
+                  <a:ext uri="{909E8E84-426E-40DD-AFC4-6F175D3DCCD1}">
+                    <a14:hiddenFill xmlns:a14="http://schemas.microsoft.com/office/drawing/2010/main">
+                      <a:solidFill>
+                        <a:srgbClr val="FFFFFF"/>
+                      </a:solidFill>
+                    </a14:hiddenFill>
+                  </a:ext>
+                </a:extLst>
+              </p:spPr>
+            </p:pic>
+            <p:pic>
+              <p:nvPicPr>
+                <p:cNvPr id="11" name="Picture 10" descr="Image result for 2 cameras cartoons">
+                  <a:extLst>
+                    <a:ext uri="{FF2B5EF4-FFF2-40B4-BE49-F238E27FC236}">
+                      <a16:creationId xmlns:a16="http://schemas.microsoft.com/office/drawing/2014/main" id="{8FEB6AC6-936F-4F45-8F84-88E5F8C5651F}"/>
+                    </a:ext>
+                  </a:extLst>
+                </p:cNvPr>
+                <p:cNvPicPr>
+                  <a:picLocks noChangeAspect="1" noChangeArrowheads="1"/>
+                </p:cNvPicPr>
+                <p:nvPr/>
+              </p:nvPicPr>
+              <p:blipFill rotWithShape="1">
+                <a:blip r:embed="rId5" cstate="print">
+                  <a:extLst>
+                    <a:ext uri="{28A0092B-C50C-407E-A947-70E740481C1C}">
+                      <a14:useLocalDpi xmlns:a14="http://schemas.microsoft.com/office/drawing/2010/main" val="0"/>
+                    </a:ext>
+                  </a:extLst>
+                </a:blip>
+                <a:srcRect t="15511" b="13154"/>
+                <a:stretch/>
+              </p:blipFill>
+              <p:spPr bwMode="auto">
+                <a:xfrm rot="10682153">
+                  <a:off x="2071199" y="26563716"/>
+                  <a:ext cx="647103" cy="461610"/>
+                </a:xfrm>
+                <a:prstGeom prst="rect">
+                  <a:avLst/>
+                </a:prstGeom>
+                <a:noFill/>
+                <a:extLst>
+                  <a:ext uri="{909E8E84-426E-40DD-AFC4-6F175D3DCCD1}">
+                    <a14:hiddenFill xmlns:a14="http://schemas.microsoft.com/office/drawing/2010/main">
+                      <a:solidFill>
+                        <a:srgbClr val="FFFFFF"/>
+                      </a:solidFill>
+                    </a14:hiddenFill>
+                  </a:ext>
+                </a:extLst>
+              </p:spPr>
+            </p:pic>
+            <p:pic>
+              <p:nvPicPr>
+                <p:cNvPr id="12" name="Picture 11" descr="Image result for 2 cameras cartoons">
+                  <a:extLst>
+                    <a:ext uri="{FF2B5EF4-FFF2-40B4-BE49-F238E27FC236}">
+                      <a16:creationId xmlns:a16="http://schemas.microsoft.com/office/drawing/2014/main" id="{153B01EB-F650-4D10-AECA-D1CED169FE78}"/>
+                    </a:ext>
+                  </a:extLst>
+                </p:cNvPr>
+                <p:cNvPicPr>
+                  <a:picLocks noChangeAspect="1" noChangeArrowheads="1"/>
+                </p:cNvPicPr>
+                <p:nvPr/>
+              </p:nvPicPr>
+              <p:blipFill rotWithShape="1">
+                <a:blip r:embed="rId5" cstate="print">
+                  <a:extLst>
+                    <a:ext uri="{28A0092B-C50C-407E-A947-70E740481C1C}">
+                      <a14:useLocalDpi xmlns:a14="http://schemas.microsoft.com/office/drawing/2010/main" val="0"/>
+                    </a:ext>
+                  </a:extLst>
+                </a:blip>
+                <a:srcRect t="16450" b="16784"/>
+                <a:stretch/>
+              </p:blipFill>
+              <p:spPr bwMode="auto">
+                <a:xfrm rot="5066743">
+                  <a:off x="3214576" y="24816684"/>
+                  <a:ext cx="617122" cy="453037"/>
+                </a:xfrm>
+                <a:prstGeom prst="rect">
+                  <a:avLst/>
+                </a:prstGeom>
+                <a:noFill/>
+                <a:extLst>
+                  <a:ext uri="{909E8E84-426E-40DD-AFC4-6F175D3DCCD1}">
+                    <a14:hiddenFill xmlns:a14="http://schemas.microsoft.com/office/drawing/2010/main">
+                      <a:solidFill>
+                        <a:srgbClr val="FFFFFF"/>
+                      </a:solidFill>
+                    </a14:hiddenFill>
+                  </a:ext>
+                </a:extLst>
+              </p:spPr>
+            </p:pic>
+          </p:grpSp>
+          <p:sp>
+            <p:nvSpPr>
+              <p:cNvPr id="6" name="TextBox 147">
+                <a:extLst>
+                  <a:ext uri="{FF2B5EF4-FFF2-40B4-BE49-F238E27FC236}">
+                    <a16:creationId xmlns:a16="http://schemas.microsoft.com/office/drawing/2014/main" id="{CF61CF13-8343-48B0-A8BA-21080870C533}"/>
+                  </a:ext>
+                </a:extLst>
+              </p:cNvPr>
+              <p:cNvSpPr txBox="1"/>
+              <p:nvPr/>
+            </p:nvSpPr>
+            <p:spPr>
+              <a:xfrm rot="4190429">
+                <a:off x="1666520" y="27343239"/>
+                <a:ext cx="1560159" cy="712423"/>
+              </a:xfrm>
+              <a:prstGeom prst="rect">
+                <a:avLst/>
+              </a:prstGeom>
+              <a:noFill/>
+            </p:spPr>
+            <p:txBody>
+              <a:bodyPr wrap="square" rtlCol="0">
+                <a:spAutoFit/>
+              </a:bodyPr>
+              <a:lstStyle>
+                <a:defPPr>
+                  <a:defRPr lang="en-US"/>
+                </a:defPPr>
+                <a:lvl1pPr marL="0" algn="l" defTabSz="4176431" rtl="0" eaLnBrk="1" latinLnBrk="0" hangingPunct="1">
+                  <a:defRPr sz="8200" kern="1200">
+                    <a:solidFill>
+                      <a:schemeClr val="tx1"/>
+                    </a:solidFill>
+                    <a:latin typeface="+mn-lt"/>
+                    <a:ea typeface="+mn-ea"/>
+                    <a:cs typeface="+mn-cs"/>
+                  </a:defRPr>
+                </a:lvl1pPr>
+                <a:lvl2pPr marL="2088215" algn="l" defTabSz="4176431" rtl="0" eaLnBrk="1" latinLnBrk="0" hangingPunct="1">
+                  <a:defRPr sz="8200" kern="1200">
+                    <a:solidFill>
+                      <a:schemeClr val="tx1"/>
+                    </a:solidFill>
+                    <a:latin typeface="+mn-lt"/>
+                    <a:ea typeface="+mn-ea"/>
+                    <a:cs typeface="+mn-cs"/>
+                  </a:defRPr>
+                </a:lvl2pPr>
+                <a:lvl3pPr marL="4176431" algn="l" defTabSz="4176431" rtl="0" eaLnBrk="1" latinLnBrk="0" hangingPunct="1">
+                  <a:defRPr sz="8200" kern="1200">
+                    <a:solidFill>
+                      <a:schemeClr val="tx1"/>
+                    </a:solidFill>
+                    <a:latin typeface="+mn-lt"/>
+                    <a:ea typeface="+mn-ea"/>
+                    <a:cs typeface="+mn-cs"/>
+                  </a:defRPr>
+                </a:lvl3pPr>
+                <a:lvl4pPr marL="6264646" algn="l" defTabSz="4176431" rtl="0" eaLnBrk="1" latinLnBrk="0" hangingPunct="1">
+                  <a:defRPr sz="8200" kern="1200">
+                    <a:solidFill>
+                      <a:schemeClr val="tx1"/>
+                    </a:solidFill>
+                    <a:latin typeface="+mn-lt"/>
+                    <a:ea typeface="+mn-ea"/>
+                    <a:cs typeface="+mn-cs"/>
+                  </a:defRPr>
+                </a:lvl4pPr>
+                <a:lvl5pPr marL="8352861" algn="l" defTabSz="4176431" rtl="0" eaLnBrk="1" latinLnBrk="0" hangingPunct="1">
+                  <a:defRPr sz="8200" kern="1200">
+                    <a:solidFill>
+                      <a:schemeClr val="tx1"/>
+                    </a:solidFill>
+                    <a:latin typeface="+mn-lt"/>
+                    <a:ea typeface="+mn-ea"/>
+                    <a:cs typeface="+mn-cs"/>
+                  </a:defRPr>
+                </a:lvl5pPr>
+                <a:lvl6pPr marL="10441076" algn="l" defTabSz="4176431" rtl="0" eaLnBrk="1" latinLnBrk="0" hangingPunct="1">
+                  <a:defRPr sz="8200" kern="1200">
+                    <a:solidFill>
+                      <a:schemeClr val="tx1"/>
+                    </a:solidFill>
+                    <a:latin typeface="+mn-lt"/>
+                    <a:ea typeface="+mn-ea"/>
+                    <a:cs typeface="+mn-cs"/>
+                  </a:defRPr>
+                </a:lvl6pPr>
+                <a:lvl7pPr marL="12529292" algn="l" defTabSz="4176431" rtl="0" eaLnBrk="1" latinLnBrk="0" hangingPunct="1">
+                  <a:defRPr sz="8200" kern="1200">
+                    <a:solidFill>
+                      <a:schemeClr val="tx1"/>
+                    </a:solidFill>
+                    <a:latin typeface="+mn-lt"/>
+                    <a:ea typeface="+mn-ea"/>
+                    <a:cs typeface="+mn-cs"/>
+                  </a:defRPr>
+                </a:lvl7pPr>
+                <a:lvl8pPr marL="14617507" algn="l" defTabSz="4176431" rtl="0" eaLnBrk="1" latinLnBrk="0" hangingPunct="1">
+                  <a:defRPr sz="8200" kern="1200">
+                    <a:solidFill>
+                      <a:schemeClr val="tx1"/>
+                    </a:solidFill>
+                    <a:latin typeface="+mn-lt"/>
+                    <a:ea typeface="+mn-ea"/>
+                    <a:cs typeface="+mn-cs"/>
+                  </a:defRPr>
+                </a:lvl8pPr>
+                <a:lvl9pPr marL="16705722" algn="l" defTabSz="4176431" rtl="0" eaLnBrk="1" latinLnBrk="0" hangingPunct="1">
+                  <a:defRPr sz="8200" kern="1200">
+                    <a:solidFill>
+                      <a:schemeClr val="tx1"/>
+                    </a:solidFill>
+                    <a:latin typeface="+mn-lt"/>
+                    <a:ea typeface="+mn-ea"/>
+                    <a:cs typeface="+mn-cs"/>
+                  </a:defRPr>
+                </a:lvl9pPr>
+              </a:lstStyle>
+              <a:p>
+                <a:pPr algn="ctr"/>
+                <a:r>
+                  <a:rPr lang="en-US" sz="1600" dirty="0">
+                    <a:latin typeface="Arial" pitchFamily="34" charset="0"/>
+                    <a:cs typeface="Arial" pitchFamily="34" charset="0"/>
+                  </a:rPr>
+                  <a:t>Entrance/</a:t>
+                </a:r>
+              </a:p>
+              <a:p>
+                <a:pPr algn="ctr"/>
+                <a:r>
+                  <a:rPr lang="en-US" sz="1600" dirty="0">
+                    <a:latin typeface="Arial" pitchFamily="34" charset="0"/>
+                    <a:cs typeface="Arial" pitchFamily="34" charset="0"/>
+                  </a:rPr>
+                  <a:t>Exit</a:t>
+                </a:r>
+                <a:endParaRPr lang="en-US" sz="1800" dirty="0">
+                  <a:latin typeface="Arial" pitchFamily="34" charset="0"/>
+                  <a:cs typeface="Arial" pitchFamily="34" charset="0"/>
+                </a:endParaRPr>
+              </a:p>
+            </p:txBody>
+          </p:sp>
+        </p:grpSp>
+        <p:sp>
+          <p:nvSpPr>
+            <p:cNvPr id="17" name="TextBox 16">
+              <a:extLst>
+                <a:ext uri="{FF2B5EF4-FFF2-40B4-BE49-F238E27FC236}">
+                  <a16:creationId xmlns:a16="http://schemas.microsoft.com/office/drawing/2014/main" id="{8FC86E93-E4D6-4B73-A2D8-0C7C1DA22439}"/>
+                </a:ext>
+              </a:extLst>
+            </p:cNvPr>
+            <p:cNvSpPr txBox="1"/>
+            <p:nvPr/>
+          </p:nvSpPr>
+          <p:spPr>
+            <a:xfrm>
+              <a:off x="3627029" y="-1"/>
+              <a:ext cx="595618" cy="377505"/>
+            </a:xfrm>
+            <a:prstGeom prst="rect">
+              <a:avLst/>
+            </a:prstGeom>
+            <a:noFill/>
+          </p:spPr>
+          <p:txBody>
+            <a:bodyPr wrap="square" rtlCol="0">
+              <a:spAutoFit/>
+            </a:bodyPr>
+            <a:lstStyle/>
+            <a:p>
+              <a:r>
+                <a:rPr lang="en-US" dirty="0">
+                  <a:solidFill>
+                    <a:schemeClr val="bg1"/>
+                  </a:solidFill>
+                </a:rPr>
+                <a:t>A</a:t>
+              </a:r>
+              <a:endParaRPr lang="en-DE" dirty="0">
+                <a:solidFill>
+                  <a:schemeClr val="bg1"/>
+                </a:solidFill>
+              </a:endParaRPr>
+            </a:p>
+          </p:txBody>
+        </p:sp>
+        <p:sp>
+          <p:nvSpPr>
+            <p:cNvPr id="18" name="TextBox 17">
+              <a:extLst>
+                <a:ext uri="{FF2B5EF4-FFF2-40B4-BE49-F238E27FC236}">
+                  <a16:creationId xmlns:a16="http://schemas.microsoft.com/office/drawing/2014/main" id="{AB1E0E47-53E1-48F6-8D1B-B56C1B2F399D}"/>
+                </a:ext>
+              </a:extLst>
+            </p:cNvPr>
+            <p:cNvSpPr txBox="1"/>
+            <p:nvPr/>
+          </p:nvSpPr>
+          <p:spPr>
+            <a:xfrm>
+              <a:off x="7841250" y="0"/>
+              <a:ext cx="595618" cy="377505"/>
+            </a:xfrm>
+            <a:prstGeom prst="rect">
+              <a:avLst/>
+            </a:prstGeom>
+            <a:noFill/>
+          </p:spPr>
+          <p:txBody>
+            <a:bodyPr wrap="square" rtlCol="0">
+              <a:spAutoFit/>
+            </a:bodyPr>
+            <a:lstStyle/>
+            <a:p>
+              <a:r>
+                <a:rPr lang="en-US" dirty="0"/>
+                <a:t>B</a:t>
+              </a:r>
+              <a:endParaRPr lang="en-DE" dirty="0"/>
+            </a:p>
+          </p:txBody>
+        </p:sp>
+      </p:grpSp>
+      <p:grpSp>
+        <p:nvGrpSpPr>
+          <p:cNvPr id="23" name="Group 22">
+            <a:extLst>
+              <a:ext uri="{FF2B5EF4-FFF2-40B4-BE49-F238E27FC236}">
+                <a16:creationId xmlns:a16="http://schemas.microsoft.com/office/drawing/2014/main" id="{0CB9BACA-9B96-45A7-8FC3-6F2DDA6EDEE9}"/>
+              </a:ext>
+            </a:extLst>
+          </p:cNvPr>
+          <p:cNvGrpSpPr/>
+          <p:nvPr/>
+        </p:nvGrpSpPr>
+        <p:grpSpPr>
+          <a:xfrm>
+            <a:off x="4464501" y="58235"/>
+            <a:ext cx="996634" cy="484586"/>
+            <a:chOff x="4556878" y="0"/>
+            <a:chExt cx="996634" cy="484586"/>
+          </a:xfrm>
+        </p:grpSpPr>
+        <p:sp>
+          <p:nvSpPr>
+            <p:cNvPr id="21" name="TextBox 147">
+              <a:extLst>
+                <a:ext uri="{FF2B5EF4-FFF2-40B4-BE49-F238E27FC236}">
+                  <a16:creationId xmlns:a16="http://schemas.microsoft.com/office/drawing/2014/main" id="{6B5214DD-191E-4551-9351-D93B69928665}"/>
+                </a:ext>
+              </a:extLst>
+            </p:cNvPr>
+            <p:cNvSpPr txBox="1"/>
+            <p:nvPr/>
+          </p:nvSpPr>
+          <p:spPr>
+            <a:xfrm>
+              <a:off x="4606106" y="22921"/>
+              <a:ext cx="898177" cy="461665"/>
+            </a:xfrm>
+            <a:prstGeom prst="rect">
+              <a:avLst/>
+            </a:prstGeom>
+            <a:noFill/>
+          </p:spPr>
+          <p:txBody>
+            <a:bodyPr wrap="square" rtlCol="0">
+              <a:spAutoFit/>
+            </a:bodyPr>
+            <a:lstStyle>
+              <a:defPPr>
+                <a:defRPr lang="en-US"/>
+              </a:defPPr>
+              <a:lvl1pPr marL="0" algn="l" defTabSz="4176431" rtl="0" eaLnBrk="1" latinLnBrk="0" hangingPunct="1">
+                <a:defRPr sz="8200" kern="1200">
+                  <a:solidFill>
+                    <a:schemeClr val="tx1"/>
+                  </a:solidFill>
+                  <a:latin typeface="+mn-lt"/>
+                  <a:ea typeface="+mn-ea"/>
+                  <a:cs typeface="+mn-cs"/>
+                </a:defRPr>
+              </a:lvl1pPr>
+              <a:lvl2pPr marL="2088215" algn="l" defTabSz="4176431" rtl="0" eaLnBrk="1" latinLnBrk="0" hangingPunct="1">
+                <a:defRPr sz="8200" kern="1200">
+                  <a:solidFill>
+                    <a:schemeClr val="tx1"/>
+                  </a:solidFill>
+                  <a:latin typeface="+mn-lt"/>
+                  <a:ea typeface="+mn-ea"/>
+                  <a:cs typeface="+mn-cs"/>
+                </a:defRPr>
+              </a:lvl2pPr>
+              <a:lvl3pPr marL="4176431" algn="l" defTabSz="4176431" rtl="0" eaLnBrk="1" latinLnBrk="0" hangingPunct="1">
+                <a:defRPr sz="8200" kern="1200">
+                  <a:solidFill>
+                    <a:schemeClr val="tx1"/>
+                  </a:solidFill>
+                  <a:latin typeface="+mn-lt"/>
+                  <a:ea typeface="+mn-ea"/>
+                  <a:cs typeface="+mn-cs"/>
+                </a:defRPr>
+              </a:lvl3pPr>
+              <a:lvl4pPr marL="6264646" algn="l" defTabSz="4176431" rtl="0" eaLnBrk="1" latinLnBrk="0" hangingPunct="1">
+                <a:defRPr sz="8200" kern="1200">
+                  <a:solidFill>
+                    <a:schemeClr val="tx1"/>
+                  </a:solidFill>
+                  <a:latin typeface="+mn-lt"/>
+                  <a:ea typeface="+mn-ea"/>
+                  <a:cs typeface="+mn-cs"/>
+                </a:defRPr>
+              </a:lvl4pPr>
+              <a:lvl5pPr marL="8352861" algn="l" defTabSz="4176431" rtl="0" eaLnBrk="1" latinLnBrk="0" hangingPunct="1">
+                <a:defRPr sz="8200" kern="1200">
+                  <a:solidFill>
+                    <a:schemeClr val="tx1"/>
+                  </a:solidFill>
+                  <a:latin typeface="+mn-lt"/>
+                  <a:ea typeface="+mn-ea"/>
+                  <a:cs typeface="+mn-cs"/>
+                </a:defRPr>
+              </a:lvl5pPr>
+              <a:lvl6pPr marL="10441076" algn="l" defTabSz="4176431" rtl="0" eaLnBrk="1" latinLnBrk="0" hangingPunct="1">
+                <a:defRPr sz="8200" kern="1200">
+                  <a:solidFill>
+                    <a:schemeClr val="tx1"/>
+                  </a:solidFill>
+                  <a:latin typeface="+mn-lt"/>
+                  <a:ea typeface="+mn-ea"/>
+                  <a:cs typeface="+mn-cs"/>
+                </a:defRPr>
+              </a:lvl6pPr>
+              <a:lvl7pPr marL="12529292" algn="l" defTabSz="4176431" rtl="0" eaLnBrk="1" latinLnBrk="0" hangingPunct="1">
+                <a:defRPr sz="8200" kern="1200">
+                  <a:solidFill>
+                    <a:schemeClr val="tx1"/>
+                  </a:solidFill>
+                  <a:latin typeface="+mn-lt"/>
+                  <a:ea typeface="+mn-ea"/>
+                  <a:cs typeface="+mn-cs"/>
+                </a:defRPr>
+              </a:lvl7pPr>
+              <a:lvl8pPr marL="14617507" algn="l" defTabSz="4176431" rtl="0" eaLnBrk="1" latinLnBrk="0" hangingPunct="1">
+                <a:defRPr sz="8200" kern="1200">
+                  <a:solidFill>
+                    <a:schemeClr val="tx1"/>
+                  </a:solidFill>
+                  <a:latin typeface="+mn-lt"/>
+                  <a:ea typeface="+mn-ea"/>
+                  <a:cs typeface="+mn-cs"/>
+                </a:defRPr>
+              </a:lvl8pPr>
+              <a:lvl9pPr marL="16705722" algn="l" defTabSz="4176431" rtl="0" eaLnBrk="1" latinLnBrk="0" hangingPunct="1">
+                <a:defRPr sz="8200" kern="1200">
+                  <a:solidFill>
+                    <a:schemeClr val="tx1"/>
+                  </a:solidFill>
+                  <a:latin typeface="+mn-lt"/>
+                  <a:ea typeface="+mn-ea"/>
+                  <a:cs typeface="+mn-cs"/>
+                </a:defRPr>
+              </a:lvl9pPr>
+            </a:lstStyle>
+            <a:p>
+              <a:pPr algn="ctr"/>
+              <a:r>
+                <a:rPr lang="en-US" sz="1200" dirty="0">
+                  <a:latin typeface="Arial" pitchFamily="34" charset="0"/>
+                  <a:cs typeface="Arial" pitchFamily="34" charset="0"/>
+                </a:rPr>
+                <a:t>Roosting site</a:t>
+              </a:r>
+            </a:p>
+          </p:txBody>
+        </p:sp>
+        <p:sp>
+          <p:nvSpPr>
+            <p:cNvPr id="22" name="Oval 21">
+              <a:extLst>
+                <a:ext uri="{FF2B5EF4-FFF2-40B4-BE49-F238E27FC236}">
+                  <a16:creationId xmlns:a16="http://schemas.microsoft.com/office/drawing/2014/main" id="{F3CD8930-BE46-4A0D-8821-128F0BAF2B67}"/>
+                </a:ext>
+              </a:extLst>
+            </p:cNvPr>
+            <p:cNvSpPr/>
+            <p:nvPr/>
+          </p:nvSpPr>
+          <p:spPr>
+            <a:xfrm>
+              <a:off x="4556878" y="0"/>
+              <a:ext cx="996634" cy="461665"/>
+            </a:xfrm>
+            <a:prstGeom prst="ellipse">
+              <a:avLst/>
+            </a:prstGeom>
+            <a:noFill/>
+            <a:ln>
+              <a:solidFill>
+                <a:schemeClr val="tx1"/>
+              </a:solidFill>
+              <a:prstDash val="sysDash"/>
+            </a:ln>
+          </p:spPr>
+          <p:style>
+            <a:lnRef idx="2">
+              <a:schemeClr val="accent1">
+                <a:shade val="50000"/>
+              </a:schemeClr>
+            </a:lnRef>
+            <a:fillRef idx="1">
+              <a:schemeClr val="accent1"/>
+            </a:fillRef>
+            <a:effectRef idx="0">
+              <a:schemeClr val="accent1"/>
+            </a:effectRef>
+            <a:fontRef idx="minor">
+              <a:schemeClr val="lt1"/>
+            </a:fontRef>
+          </p:style>
+          <p:txBody>
+            <a:bodyPr rtlCol="0" anchor="ctr"/>
+            <a:lstStyle/>
+            <a:p>
+              <a:pPr algn="ctr"/>
+              <a:endParaRPr lang="en-DE"/>
+            </a:p>
+          </p:txBody>
+        </p:sp>
+      </p:grpSp>
+      <p:grpSp>
+        <p:nvGrpSpPr>
+          <p:cNvPr id="24" name="Group 23">
+            <a:extLst>
+              <a:ext uri="{FF2B5EF4-FFF2-40B4-BE49-F238E27FC236}">
+                <a16:creationId xmlns:a16="http://schemas.microsoft.com/office/drawing/2014/main" id="{6E8FA3E4-CE97-46F6-9004-E865EC9F97C9}"/>
+              </a:ext>
+            </a:extLst>
+          </p:cNvPr>
+          <p:cNvGrpSpPr/>
+          <p:nvPr/>
+        </p:nvGrpSpPr>
+        <p:grpSpPr>
+          <a:xfrm>
+            <a:off x="3927535" y="1968993"/>
+            <a:ext cx="996634" cy="484586"/>
+            <a:chOff x="4556878" y="0"/>
+            <a:chExt cx="996634" cy="484586"/>
+          </a:xfrm>
+        </p:grpSpPr>
+        <p:sp>
+          <p:nvSpPr>
+            <p:cNvPr id="25" name="TextBox 147">
+              <a:extLst>
+                <a:ext uri="{FF2B5EF4-FFF2-40B4-BE49-F238E27FC236}">
+                  <a16:creationId xmlns:a16="http://schemas.microsoft.com/office/drawing/2014/main" id="{77F48EB0-B751-4EA6-A248-A3DCE2ABB4F4}"/>
+                </a:ext>
+              </a:extLst>
+            </p:cNvPr>
+            <p:cNvSpPr txBox="1"/>
+            <p:nvPr/>
+          </p:nvSpPr>
+          <p:spPr>
+            <a:xfrm>
+              <a:off x="4606106" y="22921"/>
+              <a:ext cx="898177" cy="461665"/>
+            </a:xfrm>
+            <a:prstGeom prst="rect">
+              <a:avLst/>
+            </a:prstGeom>
+            <a:noFill/>
+          </p:spPr>
+          <p:txBody>
+            <a:bodyPr wrap="square" rtlCol="0">
+              <a:spAutoFit/>
+            </a:bodyPr>
+            <a:lstStyle>
+              <a:defPPr>
+                <a:defRPr lang="en-US"/>
+              </a:defPPr>
+              <a:lvl1pPr marL="0" algn="l" defTabSz="4176431" rtl="0" eaLnBrk="1" latinLnBrk="0" hangingPunct="1">
+                <a:defRPr sz="8200" kern="1200">
+                  <a:solidFill>
+                    <a:schemeClr val="tx1"/>
+                  </a:solidFill>
+                  <a:latin typeface="+mn-lt"/>
+                  <a:ea typeface="+mn-ea"/>
+                  <a:cs typeface="+mn-cs"/>
+                </a:defRPr>
+              </a:lvl1pPr>
+              <a:lvl2pPr marL="2088215" algn="l" defTabSz="4176431" rtl="0" eaLnBrk="1" latinLnBrk="0" hangingPunct="1">
+                <a:defRPr sz="8200" kern="1200">
+                  <a:solidFill>
+                    <a:schemeClr val="tx1"/>
+                  </a:solidFill>
+                  <a:latin typeface="+mn-lt"/>
+                  <a:ea typeface="+mn-ea"/>
+                  <a:cs typeface="+mn-cs"/>
+                </a:defRPr>
+              </a:lvl2pPr>
+              <a:lvl3pPr marL="4176431" algn="l" defTabSz="4176431" rtl="0" eaLnBrk="1" latinLnBrk="0" hangingPunct="1">
+                <a:defRPr sz="8200" kern="1200">
+                  <a:solidFill>
+                    <a:schemeClr val="tx1"/>
+                  </a:solidFill>
+                  <a:latin typeface="+mn-lt"/>
+                  <a:ea typeface="+mn-ea"/>
+                  <a:cs typeface="+mn-cs"/>
+                </a:defRPr>
+              </a:lvl3pPr>
+              <a:lvl4pPr marL="6264646" algn="l" defTabSz="4176431" rtl="0" eaLnBrk="1" latinLnBrk="0" hangingPunct="1">
+                <a:defRPr sz="8200" kern="1200">
+                  <a:solidFill>
+                    <a:schemeClr val="tx1"/>
+                  </a:solidFill>
+                  <a:latin typeface="+mn-lt"/>
+                  <a:ea typeface="+mn-ea"/>
+                  <a:cs typeface="+mn-cs"/>
+                </a:defRPr>
+              </a:lvl4pPr>
+              <a:lvl5pPr marL="8352861" algn="l" defTabSz="4176431" rtl="0" eaLnBrk="1" latinLnBrk="0" hangingPunct="1">
+                <a:defRPr sz="8200" kern="1200">
+                  <a:solidFill>
+                    <a:schemeClr val="tx1"/>
+                  </a:solidFill>
+                  <a:latin typeface="+mn-lt"/>
+                  <a:ea typeface="+mn-ea"/>
+                  <a:cs typeface="+mn-cs"/>
+                </a:defRPr>
+              </a:lvl5pPr>
+              <a:lvl6pPr marL="10441076" algn="l" defTabSz="4176431" rtl="0" eaLnBrk="1" latinLnBrk="0" hangingPunct="1">
+                <a:defRPr sz="8200" kern="1200">
+                  <a:solidFill>
+                    <a:schemeClr val="tx1"/>
+                  </a:solidFill>
+                  <a:latin typeface="+mn-lt"/>
+                  <a:ea typeface="+mn-ea"/>
+                  <a:cs typeface="+mn-cs"/>
+                </a:defRPr>
+              </a:lvl6pPr>
+              <a:lvl7pPr marL="12529292" algn="l" defTabSz="4176431" rtl="0" eaLnBrk="1" latinLnBrk="0" hangingPunct="1">
+                <a:defRPr sz="8200" kern="1200">
+                  <a:solidFill>
+                    <a:schemeClr val="tx1"/>
+                  </a:solidFill>
+                  <a:latin typeface="+mn-lt"/>
+                  <a:ea typeface="+mn-ea"/>
+                  <a:cs typeface="+mn-cs"/>
+                </a:defRPr>
+              </a:lvl7pPr>
+              <a:lvl8pPr marL="14617507" algn="l" defTabSz="4176431" rtl="0" eaLnBrk="1" latinLnBrk="0" hangingPunct="1">
+                <a:defRPr sz="8200" kern="1200">
+                  <a:solidFill>
+                    <a:schemeClr val="tx1"/>
+                  </a:solidFill>
+                  <a:latin typeface="+mn-lt"/>
+                  <a:ea typeface="+mn-ea"/>
+                  <a:cs typeface="+mn-cs"/>
+                </a:defRPr>
+              </a:lvl8pPr>
+              <a:lvl9pPr marL="16705722" algn="l" defTabSz="4176431" rtl="0" eaLnBrk="1" latinLnBrk="0" hangingPunct="1">
+                <a:defRPr sz="8200" kern="1200">
+                  <a:solidFill>
+                    <a:schemeClr val="tx1"/>
+                  </a:solidFill>
+                  <a:latin typeface="+mn-lt"/>
+                  <a:ea typeface="+mn-ea"/>
+                  <a:cs typeface="+mn-cs"/>
+                </a:defRPr>
+              </a:lvl9pPr>
+            </a:lstStyle>
+            <a:p>
+              <a:pPr algn="ctr"/>
+              <a:r>
+                <a:rPr lang="en-US" sz="1200" dirty="0">
+                  <a:latin typeface="Arial" pitchFamily="34" charset="0"/>
+                  <a:cs typeface="Arial" pitchFamily="34" charset="0"/>
+                </a:rPr>
+                <a:t>Roosting site</a:t>
+              </a:r>
+            </a:p>
+          </p:txBody>
+        </p:sp>
+        <p:sp>
+          <p:nvSpPr>
+            <p:cNvPr id="26" name="Oval 25">
+              <a:extLst>
+                <a:ext uri="{FF2B5EF4-FFF2-40B4-BE49-F238E27FC236}">
+                  <a16:creationId xmlns:a16="http://schemas.microsoft.com/office/drawing/2014/main" id="{E39D8B93-3582-4F42-A16E-8786270378F7}"/>
+                </a:ext>
+              </a:extLst>
+            </p:cNvPr>
+            <p:cNvSpPr/>
+            <p:nvPr/>
+          </p:nvSpPr>
+          <p:spPr>
+            <a:xfrm>
+              <a:off x="4556878" y="0"/>
+              <a:ext cx="996634" cy="461665"/>
+            </a:xfrm>
+            <a:prstGeom prst="ellipse">
+              <a:avLst/>
+            </a:prstGeom>
+            <a:noFill/>
+            <a:ln>
+              <a:solidFill>
+                <a:schemeClr val="tx1"/>
+              </a:solidFill>
+              <a:prstDash val="sysDash"/>
+            </a:ln>
+          </p:spPr>
+          <p:style>
+            <a:lnRef idx="2">
+              <a:schemeClr val="accent1">
+                <a:shade val="50000"/>
+              </a:schemeClr>
+            </a:lnRef>
+            <a:fillRef idx="1">
+              <a:schemeClr val="accent1"/>
+            </a:fillRef>
+            <a:effectRef idx="0">
+              <a:schemeClr val="accent1"/>
+            </a:effectRef>
+            <a:fontRef idx="minor">
+              <a:schemeClr val="lt1"/>
+            </a:fontRef>
+          </p:style>
+          <p:txBody>
+            <a:bodyPr rtlCol="0" anchor="ctr"/>
+            <a:lstStyle/>
+            <a:p>
+              <a:pPr algn="ctr"/>
+              <a:endParaRPr lang="en-DE"/>
+            </a:p>
+          </p:txBody>
+        </p:sp>
+      </p:grpSp>
+      <p:grpSp>
+        <p:nvGrpSpPr>
+          <p:cNvPr id="27" name="Group 26">
+            <a:extLst>
+              <a:ext uri="{FF2B5EF4-FFF2-40B4-BE49-F238E27FC236}">
+                <a16:creationId xmlns:a16="http://schemas.microsoft.com/office/drawing/2014/main" id="{51DC4D91-8761-43CC-80F1-AF37F6078123}"/>
+              </a:ext>
+            </a:extLst>
+          </p:cNvPr>
+          <p:cNvGrpSpPr/>
+          <p:nvPr/>
+        </p:nvGrpSpPr>
+        <p:grpSpPr>
+          <a:xfrm>
+            <a:off x="83970" y="1119103"/>
+            <a:ext cx="996634" cy="484586"/>
+            <a:chOff x="4556878" y="0"/>
+            <a:chExt cx="996634" cy="484586"/>
+          </a:xfrm>
+        </p:grpSpPr>
+        <p:sp>
+          <p:nvSpPr>
+            <p:cNvPr id="28" name="TextBox 147">
+              <a:extLst>
+                <a:ext uri="{FF2B5EF4-FFF2-40B4-BE49-F238E27FC236}">
+                  <a16:creationId xmlns:a16="http://schemas.microsoft.com/office/drawing/2014/main" id="{C0C2DC27-A8F1-4ED9-9569-8AAA2DEB124E}"/>
+                </a:ext>
+              </a:extLst>
+            </p:cNvPr>
+            <p:cNvSpPr txBox="1"/>
+            <p:nvPr/>
+          </p:nvSpPr>
+          <p:spPr>
+            <a:xfrm>
+              <a:off x="4606106" y="22921"/>
+              <a:ext cx="898177" cy="461665"/>
+            </a:xfrm>
+            <a:prstGeom prst="rect">
+              <a:avLst/>
+            </a:prstGeom>
+            <a:noFill/>
+          </p:spPr>
+          <p:txBody>
+            <a:bodyPr wrap="square" rtlCol="0">
+              <a:spAutoFit/>
+            </a:bodyPr>
+            <a:lstStyle>
+              <a:defPPr>
+                <a:defRPr lang="en-US"/>
+              </a:defPPr>
+              <a:lvl1pPr marL="0" algn="l" defTabSz="4176431" rtl="0" eaLnBrk="1" latinLnBrk="0" hangingPunct="1">
+                <a:defRPr sz="8200" kern="1200">
+                  <a:solidFill>
+                    <a:schemeClr val="tx1"/>
+                  </a:solidFill>
+                  <a:latin typeface="+mn-lt"/>
+                  <a:ea typeface="+mn-ea"/>
+                  <a:cs typeface="+mn-cs"/>
+                </a:defRPr>
+              </a:lvl1pPr>
+              <a:lvl2pPr marL="2088215" algn="l" defTabSz="4176431" rtl="0" eaLnBrk="1" latinLnBrk="0" hangingPunct="1">
+                <a:defRPr sz="8200" kern="1200">
+                  <a:solidFill>
+                    <a:schemeClr val="tx1"/>
+                  </a:solidFill>
+                  <a:latin typeface="+mn-lt"/>
+                  <a:ea typeface="+mn-ea"/>
+                  <a:cs typeface="+mn-cs"/>
+                </a:defRPr>
+              </a:lvl2pPr>
+              <a:lvl3pPr marL="4176431" algn="l" defTabSz="4176431" rtl="0" eaLnBrk="1" latinLnBrk="0" hangingPunct="1">
+                <a:defRPr sz="8200" kern="1200">
+                  <a:solidFill>
+                    <a:schemeClr val="tx1"/>
+                  </a:solidFill>
+                  <a:latin typeface="+mn-lt"/>
+                  <a:ea typeface="+mn-ea"/>
+                  <a:cs typeface="+mn-cs"/>
+                </a:defRPr>
+              </a:lvl3pPr>
+              <a:lvl4pPr marL="6264646" algn="l" defTabSz="4176431" rtl="0" eaLnBrk="1" latinLnBrk="0" hangingPunct="1">
+                <a:defRPr sz="8200" kern="1200">
+                  <a:solidFill>
+                    <a:schemeClr val="tx1"/>
+                  </a:solidFill>
+                  <a:latin typeface="+mn-lt"/>
+                  <a:ea typeface="+mn-ea"/>
+                  <a:cs typeface="+mn-cs"/>
+                </a:defRPr>
+              </a:lvl4pPr>
+              <a:lvl5pPr marL="8352861" algn="l" defTabSz="4176431" rtl="0" eaLnBrk="1" latinLnBrk="0" hangingPunct="1">
+                <a:defRPr sz="8200" kern="1200">
+                  <a:solidFill>
+                    <a:schemeClr val="tx1"/>
+                  </a:solidFill>
+                  <a:latin typeface="+mn-lt"/>
+                  <a:ea typeface="+mn-ea"/>
+                  <a:cs typeface="+mn-cs"/>
+                </a:defRPr>
+              </a:lvl5pPr>
+              <a:lvl6pPr marL="10441076" algn="l" defTabSz="4176431" rtl="0" eaLnBrk="1" latinLnBrk="0" hangingPunct="1">
+                <a:defRPr sz="8200" kern="1200">
+                  <a:solidFill>
+                    <a:schemeClr val="tx1"/>
+                  </a:solidFill>
+                  <a:latin typeface="+mn-lt"/>
+                  <a:ea typeface="+mn-ea"/>
+                  <a:cs typeface="+mn-cs"/>
+                </a:defRPr>
+              </a:lvl6pPr>
+              <a:lvl7pPr marL="12529292" algn="l" defTabSz="4176431" rtl="0" eaLnBrk="1" latinLnBrk="0" hangingPunct="1">
+                <a:defRPr sz="8200" kern="1200">
+                  <a:solidFill>
+                    <a:schemeClr val="tx1"/>
+                  </a:solidFill>
+                  <a:latin typeface="+mn-lt"/>
+                  <a:ea typeface="+mn-ea"/>
+                  <a:cs typeface="+mn-cs"/>
+                </a:defRPr>
+              </a:lvl7pPr>
+              <a:lvl8pPr marL="14617507" algn="l" defTabSz="4176431" rtl="0" eaLnBrk="1" latinLnBrk="0" hangingPunct="1">
+                <a:defRPr sz="8200" kern="1200">
+                  <a:solidFill>
+                    <a:schemeClr val="tx1"/>
+                  </a:solidFill>
+                  <a:latin typeface="+mn-lt"/>
+                  <a:ea typeface="+mn-ea"/>
+                  <a:cs typeface="+mn-cs"/>
+                </a:defRPr>
+              </a:lvl8pPr>
+              <a:lvl9pPr marL="16705722" algn="l" defTabSz="4176431" rtl="0" eaLnBrk="1" latinLnBrk="0" hangingPunct="1">
+                <a:defRPr sz="8200" kern="1200">
+                  <a:solidFill>
+                    <a:schemeClr val="tx1"/>
+                  </a:solidFill>
+                  <a:latin typeface="+mn-lt"/>
+                  <a:ea typeface="+mn-ea"/>
+                  <a:cs typeface="+mn-cs"/>
+                </a:defRPr>
+              </a:lvl9pPr>
+            </a:lstStyle>
+            <a:p>
+              <a:pPr algn="ctr"/>
+              <a:r>
+                <a:rPr lang="en-US" sz="1200" dirty="0">
+                  <a:solidFill>
+                    <a:schemeClr val="bg1"/>
+                  </a:solidFill>
+                  <a:latin typeface="Arial" pitchFamily="34" charset="0"/>
+                  <a:cs typeface="Arial" pitchFamily="34" charset="0"/>
+                </a:rPr>
+                <a:t>Roosting site</a:t>
+              </a:r>
+            </a:p>
+          </p:txBody>
+        </p:sp>
+        <p:sp>
+          <p:nvSpPr>
+            <p:cNvPr id="29" name="Oval 28">
+              <a:extLst>
+                <a:ext uri="{FF2B5EF4-FFF2-40B4-BE49-F238E27FC236}">
+                  <a16:creationId xmlns:a16="http://schemas.microsoft.com/office/drawing/2014/main" id="{BACBFF81-7326-4DFD-893E-D0D1891DCC18}"/>
+                </a:ext>
+              </a:extLst>
+            </p:cNvPr>
+            <p:cNvSpPr/>
+            <p:nvPr/>
+          </p:nvSpPr>
+          <p:spPr>
+            <a:xfrm>
+              <a:off x="4556878" y="0"/>
+              <a:ext cx="996634" cy="461665"/>
+            </a:xfrm>
+            <a:prstGeom prst="ellipse">
+              <a:avLst/>
+            </a:prstGeom>
+            <a:noFill/>
+            <a:ln>
+              <a:solidFill>
+                <a:schemeClr val="bg1"/>
+              </a:solidFill>
+              <a:prstDash val="sysDash"/>
+            </a:ln>
+          </p:spPr>
+          <p:style>
+            <a:lnRef idx="2">
+              <a:schemeClr val="accent1">
+                <a:shade val="50000"/>
+              </a:schemeClr>
+            </a:lnRef>
+            <a:fillRef idx="1">
+              <a:schemeClr val="accent1"/>
+            </a:fillRef>
+            <a:effectRef idx="0">
+              <a:schemeClr val="accent1"/>
+            </a:effectRef>
+            <a:fontRef idx="minor">
+              <a:schemeClr val="lt1"/>
+            </a:fontRef>
+          </p:style>
+          <p:txBody>
+            <a:bodyPr rtlCol="0" anchor="ctr"/>
+            <a:lstStyle/>
+            <a:p>
+              <a:pPr algn="ctr"/>
+              <a:endParaRPr lang="en-DE"/>
+            </a:p>
+          </p:txBody>
+        </p:sp>
+      </p:grpSp>
+      <p:grpSp>
+        <p:nvGrpSpPr>
+          <p:cNvPr id="30" name="Group 29">
+            <a:extLst>
+              <a:ext uri="{FF2B5EF4-FFF2-40B4-BE49-F238E27FC236}">
+                <a16:creationId xmlns:a16="http://schemas.microsoft.com/office/drawing/2014/main" id="{2BC175B8-1361-4408-ABC2-3E60BA6B1E5C}"/>
+              </a:ext>
+            </a:extLst>
+          </p:cNvPr>
+          <p:cNvGrpSpPr/>
+          <p:nvPr/>
+        </p:nvGrpSpPr>
+        <p:grpSpPr>
+          <a:xfrm>
+            <a:off x="851237" y="337930"/>
+            <a:ext cx="996634" cy="484586"/>
+            <a:chOff x="4556878" y="0"/>
+            <a:chExt cx="996634" cy="484586"/>
+          </a:xfrm>
+        </p:grpSpPr>
+        <p:sp>
+          <p:nvSpPr>
+            <p:cNvPr id="31" name="TextBox 147">
+              <a:extLst>
+                <a:ext uri="{FF2B5EF4-FFF2-40B4-BE49-F238E27FC236}">
+                  <a16:creationId xmlns:a16="http://schemas.microsoft.com/office/drawing/2014/main" id="{39FDE80B-9753-4E74-A2CC-CBB7A1FAE3E7}"/>
+                </a:ext>
+              </a:extLst>
+            </p:cNvPr>
+            <p:cNvSpPr txBox="1"/>
+            <p:nvPr/>
+          </p:nvSpPr>
+          <p:spPr>
+            <a:xfrm>
+              <a:off x="4606106" y="22921"/>
+              <a:ext cx="898177" cy="461665"/>
+            </a:xfrm>
+            <a:prstGeom prst="rect">
+              <a:avLst/>
+            </a:prstGeom>
+            <a:noFill/>
+          </p:spPr>
+          <p:txBody>
+            <a:bodyPr wrap="square" rtlCol="0">
+              <a:spAutoFit/>
+            </a:bodyPr>
+            <a:lstStyle>
+              <a:defPPr>
+                <a:defRPr lang="en-US"/>
+              </a:defPPr>
+              <a:lvl1pPr marL="0" algn="l" defTabSz="4176431" rtl="0" eaLnBrk="1" latinLnBrk="0" hangingPunct="1">
+                <a:defRPr sz="8200" kern="1200">
+                  <a:solidFill>
+                    <a:schemeClr val="tx1"/>
+                  </a:solidFill>
+                  <a:latin typeface="+mn-lt"/>
+                  <a:ea typeface="+mn-ea"/>
+                  <a:cs typeface="+mn-cs"/>
+                </a:defRPr>
+              </a:lvl1pPr>
+              <a:lvl2pPr marL="2088215" algn="l" defTabSz="4176431" rtl="0" eaLnBrk="1" latinLnBrk="0" hangingPunct="1">
+                <a:defRPr sz="8200" kern="1200">
+                  <a:solidFill>
+                    <a:schemeClr val="tx1"/>
+                  </a:solidFill>
+                  <a:latin typeface="+mn-lt"/>
+                  <a:ea typeface="+mn-ea"/>
+                  <a:cs typeface="+mn-cs"/>
+                </a:defRPr>
+              </a:lvl2pPr>
+              <a:lvl3pPr marL="4176431" algn="l" defTabSz="4176431" rtl="0" eaLnBrk="1" latinLnBrk="0" hangingPunct="1">
+                <a:defRPr sz="8200" kern="1200">
+                  <a:solidFill>
+                    <a:schemeClr val="tx1"/>
+                  </a:solidFill>
+                  <a:latin typeface="+mn-lt"/>
+                  <a:ea typeface="+mn-ea"/>
+                  <a:cs typeface="+mn-cs"/>
+                </a:defRPr>
+              </a:lvl3pPr>
+              <a:lvl4pPr marL="6264646" algn="l" defTabSz="4176431" rtl="0" eaLnBrk="1" latinLnBrk="0" hangingPunct="1">
+                <a:defRPr sz="8200" kern="1200">
+                  <a:solidFill>
+                    <a:schemeClr val="tx1"/>
+                  </a:solidFill>
+                  <a:latin typeface="+mn-lt"/>
+                  <a:ea typeface="+mn-ea"/>
+                  <a:cs typeface="+mn-cs"/>
+                </a:defRPr>
+              </a:lvl4pPr>
+              <a:lvl5pPr marL="8352861" algn="l" defTabSz="4176431" rtl="0" eaLnBrk="1" latinLnBrk="0" hangingPunct="1">
+                <a:defRPr sz="8200" kern="1200">
+                  <a:solidFill>
+                    <a:schemeClr val="tx1"/>
+                  </a:solidFill>
+                  <a:latin typeface="+mn-lt"/>
+                  <a:ea typeface="+mn-ea"/>
+                  <a:cs typeface="+mn-cs"/>
+                </a:defRPr>
+              </a:lvl5pPr>
+              <a:lvl6pPr marL="10441076" algn="l" defTabSz="4176431" rtl="0" eaLnBrk="1" latinLnBrk="0" hangingPunct="1">
+                <a:defRPr sz="8200" kern="1200">
+                  <a:solidFill>
+                    <a:schemeClr val="tx1"/>
+                  </a:solidFill>
+                  <a:latin typeface="+mn-lt"/>
+                  <a:ea typeface="+mn-ea"/>
+                  <a:cs typeface="+mn-cs"/>
+                </a:defRPr>
+              </a:lvl6pPr>
+              <a:lvl7pPr marL="12529292" algn="l" defTabSz="4176431" rtl="0" eaLnBrk="1" latinLnBrk="0" hangingPunct="1">
+                <a:defRPr sz="8200" kern="1200">
+                  <a:solidFill>
+                    <a:schemeClr val="tx1"/>
+                  </a:solidFill>
+                  <a:latin typeface="+mn-lt"/>
+                  <a:ea typeface="+mn-ea"/>
+                  <a:cs typeface="+mn-cs"/>
+                </a:defRPr>
+              </a:lvl7pPr>
+              <a:lvl8pPr marL="14617507" algn="l" defTabSz="4176431" rtl="0" eaLnBrk="1" latinLnBrk="0" hangingPunct="1">
+                <a:defRPr sz="8200" kern="1200">
+                  <a:solidFill>
+                    <a:schemeClr val="tx1"/>
+                  </a:solidFill>
+                  <a:latin typeface="+mn-lt"/>
+                  <a:ea typeface="+mn-ea"/>
+                  <a:cs typeface="+mn-cs"/>
+                </a:defRPr>
+              </a:lvl8pPr>
+              <a:lvl9pPr marL="16705722" algn="l" defTabSz="4176431" rtl="0" eaLnBrk="1" latinLnBrk="0" hangingPunct="1">
+                <a:defRPr sz="8200" kern="1200">
+                  <a:solidFill>
+                    <a:schemeClr val="tx1"/>
+                  </a:solidFill>
+                  <a:latin typeface="+mn-lt"/>
+                  <a:ea typeface="+mn-ea"/>
+                  <a:cs typeface="+mn-cs"/>
+                </a:defRPr>
+              </a:lvl9pPr>
+            </a:lstStyle>
+            <a:p>
+              <a:pPr algn="ctr"/>
+              <a:r>
+                <a:rPr lang="en-US" sz="1200" dirty="0">
+                  <a:solidFill>
+                    <a:schemeClr val="bg1"/>
+                  </a:solidFill>
+                  <a:latin typeface="Arial" pitchFamily="34" charset="0"/>
+                  <a:cs typeface="Arial" pitchFamily="34" charset="0"/>
+                </a:rPr>
+                <a:t>Roosting site</a:t>
+              </a:r>
+            </a:p>
+          </p:txBody>
+        </p:sp>
+        <p:sp>
+          <p:nvSpPr>
+            <p:cNvPr id="32" name="Oval 31">
+              <a:extLst>
+                <a:ext uri="{FF2B5EF4-FFF2-40B4-BE49-F238E27FC236}">
+                  <a16:creationId xmlns:a16="http://schemas.microsoft.com/office/drawing/2014/main" id="{DC5E4DEE-02DC-4819-AEAA-B095F60A3BB8}"/>
+                </a:ext>
+              </a:extLst>
+            </p:cNvPr>
+            <p:cNvSpPr/>
+            <p:nvPr/>
+          </p:nvSpPr>
+          <p:spPr>
+            <a:xfrm>
+              <a:off x="4556878" y="0"/>
+              <a:ext cx="996634" cy="461665"/>
+            </a:xfrm>
+            <a:prstGeom prst="ellipse">
+              <a:avLst/>
+            </a:prstGeom>
+            <a:noFill/>
+            <a:ln>
+              <a:solidFill>
+                <a:schemeClr val="bg1"/>
+              </a:solidFill>
+              <a:prstDash val="sysDash"/>
+            </a:ln>
+          </p:spPr>
+          <p:style>
+            <a:lnRef idx="2">
+              <a:schemeClr val="accent1">
+                <a:shade val="50000"/>
+              </a:schemeClr>
+            </a:lnRef>
+            <a:fillRef idx="1">
+              <a:schemeClr val="accent1"/>
+            </a:fillRef>
+            <a:effectRef idx="0">
+              <a:schemeClr val="accent1"/>
+            </a:effectRef>
+            <a:fontRef idx="minor">
+              <a:schemeClr val="lt1"/>
+            </a:fontRef>
+          </p:style>
+          <p:txBody>
+            <a:bodyPr rtlCol="0" anchor="ctr"/>
+            <a:lstStyle/>
+            <a:p>
+              <a:pPr algn="ctr"/>
+              <a:endParaRPr lang="en-DE"/>
+            </a:p>
+          </p:txBody>
+        </p:sp>
+      </p:grpSp>
+      <p:sp>
+        <p:nvSpPr>
+          <p:cNvPr id="36" name="TextBox 35">
+            <a:extLst>
+              <a:ext uri="{FF2B5EF4-FFF2-40B4-BE49-F238E27FC236}">
+                <a16:creationId xmlns:a16="http://schemas.microsoft.com/office/drawing/2014/main" id="{E4B6F2A6-4C5D-4D85-BC19-CAD8421C5D61}"/>
+              </a:ext>
+            </a:extLst>
+          </p:cNvPr>
+          <p:cNvSpPr txBox="1"/>
+          <p:nvPr/>
+        </p:nvSpPr>
+        <p:spPr>
+          <a:xfrm>
+            <a:off x="6597463" y="987204"/>
+            <a:ext cx="323454" cy="369332"/>
+          </a:xfrm>
+          <a:prstGeom prst="rect">
+            <a:avLst/>
+          </a:prstGeom>
+          <a:noFill/>
+        </p:spPr>
+        <p:txBody>
+          <a:bodyPr wrap="square" rtlCol="0">
+            <a:spAutoFit/>
+          </a:bodyPr>
+          <a:lstStyle/>
+          <a:p>
+            <a:r>
+              <a:rPr lang="en-US" dirty="0"/>
+              <a:t>1</a:t>
+            </a:r>
+            <a:endParaRPr lang="en-DE" dirty="0"/>
+          </a:p>
+        </p:txBody>
+      </p:sp>
+      <p:sp>
+        <p:nvSpPr>
+          <p:cNvPr id="37" name="TextBox 36">
+            <a:extLst>
+              <a:ext uri="{FF2B5EF4-FFF2-40B4-BE49-F238E27FC236}">
+                <a16:creationId xmlns:a16="http://schemas.microsoft.com/office/drawing/2014/main" id="{22AE05F1-2FBB-4730-9D51-EF0FE01E797F}"/>
+              </a:ext>
+            </a:extLst>
+          </p:cNvPr>
+          <p:cNvSpPr txBox="1"/>
+          <p:nvPr/>
+        </p:nvSpPr>
+        <p:spPr>
+          <a:xfrm>
+            <a:off x="5450980" y="1089654"/>
+            <a:ext cx="323454" cy="369332"/>
+          </a:xfrm>
+          <a:prstGeom prst="rect">
+            <a:avLst/>
+          </a:prstGeom>
+          <a:noFill/>
+        </p:spPr>
+        <p:txBody>
+          <a:bodyPr wrap="square" rtlCol="0">
+            <a:spAutoFit/>
+          </a:bodyPr>
+          <a:lstStyle/>
+          <a:p>
+            <a:r>
+              <a:rPr lang="en-US" dirty="0"/>
+              <a:t>2</a:t>
+            </a:r>
+            <a:endParaRPr lang="en-DE" dirty="0"/>
+          </a:p>
+        </p:txBody>
+      </p:sp>
+      <p:sp>
+        <p:nvSpPr>
+          <p:cNvPr id="38" name="TextBox 37">
+            <a:extLst>
+              <a:ext uri="{FF2B5EF4-FFF2-40B4-BE49-F238E27FC236}">
+                <a16:creationId xmlns:a16="http://schemas.microsoft.com/office/drawing/2014/main" id="{F877227F-8A8A-4CF0-8462-76714A0D3AF6}"/>
+              </a:ext>
+            </a:extLst>
+          </p:cNvPr>
+          <p:cNvSpPr txBox="1"/>
+          <p:nvPr/>
+        </p:nvSpPr>
+        <p:spPr>
+          <a:xfrm>
+            <a:off x="5835627" y="2099012"/>
+            <a:ext cx="323454" cy="369332"/>
+          </a:xfrm>
+          <a:prstGeom prst="rect">
+            <a:avLst/>
+          </a:prstGeom>
+          <a:noFill/>
+        </p:spPr>
+        <p:txBody>
+          <a:bodyPr wrap="square" rtlCol="0">
+            <a:spAutoFit/>
+          </a:bodyPr>
+          <a:lstStyle/>
+          <a:p>
+            <a:r>
+              <a:rPr lang="en-US" dirty="0"/>
+              <a:t>3</a:t>
+            </a:r>
+            <a:endParaRPr lang="en-DE" dirty="0"/>
+          </a:p>
+        </p:txBody>
+      </p:sp>
     </p:spTree>
     <p:extLst>
       <p:ext uri="{BB962C8B-B14F-4D97-AF65-F5344CB8AC3E}">

</xml_diff>

<commit_message>
latest status of manuscript + assoc. files.
</commit_message>
<xml_diff>
--- a/hbc_paper/figures/schematics_hbcpaper.pptx
+++ b/hbc_paper/figures/schematics_hbcpaper.pptx
@@ -7,6 +7,7 @@
   <p:sldIdLst>
     <p:sldId id="256" r:id="rId2"/>
     <p:sldId id="257" r:id="rId3"/>
+    <p:sldId id="258" r:id="rId4"/>
   </p:sldIdLst>
   <p:sldSz cx="12192000" cy="6858000"/>
   <p:notesSz cx="6858000" cy="9144000"/>
@@ -262,7 +263,7 @@
           <a:p>
             <a:fld id="{282298F1-C911-427F-A662-45721A4CC261}" type="datetimeFigureOut">
               <a:rPr lang="en-DE" smtClean="0"/>
-              <a:t>28/12/2020</a:t>
+              <a:t>12/01/2021</a:t>
             </a:fld>
             <a:endParaRPr lang="en-DE"/>
           </a:p>
@@ -462,7 +463,7 @@
           <a:p>
             <a:fld id="{282298F1-C911-427F-A662-45721A4CC261}" type="datetimeFigureOut">
               <a:rPr lang="en-DE" smtClean="0"/>
-              <a:t>28/12/2020</a:t>
+              <a:t>12/01/2021</a:t>
             </a:fld>
             <a:endParaRPr lang="en-DE"/>
           </a:p>
@@ -672,7 +673,7 @@
           <a:p>
             <a:fld id="{282298F1-C911-427F-A662-45721A4CC261}" type="datetimeFigureOut">
               <a:rPr lang="en-DE" smtClean="0"/>
-              <a:t>28/12/2020</a:t>
+              <a:t>12/01/2021</a:t>
             </a:fld>
             <a:endParaRPr lang="en-DE"/>
           </a:p>
@@ -872,7 +873,7 @@
           <a:p>
             <a:fld id="{282298F1-C911-427F-A662-45721A4CC261}" type="datetimeFigureOut">
               <a:rPr lang="en-DE" smtClean="0"/>
-              <a:t>28/12/2020</a:t>
+              <a:t>12/01/2021</a:t>
             </a:fld>
             <a:endParaRPr lang="en-DE"/>
           </a:p>
@@ -1148,7 +1149,7 @@
           <a:p>
             <a:fld id="{282298F1-C911-427F-A662-45721A4CC261}" type="datetimeFigureOut">
               <a:rPr lang="en-DE" smtClean="0"/>
-              <a:t>28/12/2020</a:t>
+              <a:t>12/01/2021</a:t>
             </a:fld>
             <a:endParaRPr lang="en-DE"/>
           </a:p>
@@ -1416,7 +1417,7 @@
           <a:p>
             <a:fld id="{282298F1-C911-427F-A662-45721A4CC261}" type="datetimeFigureOut">
               <a:rPr lang="en-DE" smtClean="0"/>
-              <a:t>28/12/2020</a:t>
+              <a:t>12/01/2021</a:t>
             </a:fld>
             <a:endParaRPr lang="en-DE"/>
           </a:p>
@@ -1831,7 +1832,7 @@
           <a:p>
             <a:fld id="{282298F1-C911-427F-A662-45721A4CC261}" type="datetimeFigureOut">
               <a:rPr lang="en-DE" smtClean="0"/>
-              <a:t>28/12/2020</a:t>
+              <a:t>12/01/2021</a:t>
             </a:fld>
             <a:endParaRPr lang="en-DE"/>
           </a:p>
@@ -1973,7 +1974,7 @@
           <a:p>
             <a:fld id="{282298F1-C911-427F-A662-45721A4CC261}" type="datetimeFigureOut">
               <a:rPr lang="en-DE" smtClean="0"/>
-              <a:t>28/12/2020</a:t>
+              <a:t>12/01/2021</a:t>
             </a:fld>
             <a:endParaRPr lang="en-DE"/>
           </a:p>
@@ -2086,7 +2087,7 @@
           <a:p>
             <a:fld id="{282298F1-C911-427F-A662-45721A4CC261}" type="datetimeFigureOut">
               <a:rPr lang="en-DE" smtClean="0"/>
-              <a:t>28/12/2020</a:t>
+              <a:t>12/01/2021</a:t>
             </a:fld>
             <a:endParaRPr lang="en-DE"/>
           </a:p>
@@ -2399,7 +2400,7 @@
           <a:p>
             <a:fld id="{282298F1-C911-427F-A662-45721A4CC261}" type="datetimeFigureOut">
               <a:rPr lang="en-DE" smtClean="0"/>
-              <a:t>28/12/2020</a:t>
+              <a:t>12/01/2021</a:t>
             </a:fld>
             <a:endParaRPr lang="en-DE"/>
           </a:p>
@@ -2688,7 +2689,7 @@
           <a:p>
             <a:fld id="{282298F1-C911-427F-A662-45721A4CC261}" type="datetimeFigureOut">
               <a:rPr lang="en-DE" smtClean="0"/>
-              <a:t>28/12/2020</a:t>
+              <a:t>12/01/2021</a:t>
             </a:fld>
             <a:endParaRPr lang="en-DE"/>
           </a:p>
@@ -2931,7 +2932,7 @@
           <a:p>
             <a:fld id="{282298F1-C911-427F-A662-45721A4CC261}" type="datetimeFigureOut">
               <a:rPr lang="en-DE" smtClean="0"/>
-              <a:t>28/12/2020</a:t>
+              <a:t>12/01/2021</a:t>
             </a:fld>
             <a:endParaRPr lang="en-DE"/>
           </a:p>
@@ -5432,8 +5433,8 @@
               </p:blipFill>
               <p:spPr bwMode="auto">
                 <a:xfrm rot="3300000">
-                  <a:off x="1087105" y="24920630"/>
-                  <a:ext cx="415531" cy="516887"/>
+                  <a:off x="1102750" y="25187681"/>
+                  <a:ext cx="415532" cy="516887"/>
                 </a:xfrm>
                 <a:prstGeom prst="rect">
                   <a:avLst/>
@@ -5476,9 +5477,9 @@
                 <a:stretch/>
               </p:blipFill>
               <p:spPr bwMode="auto">
-                <a:xfrm rot="-7380000">
-                  <a:off x="3221769" y="25275932"/>
-                  <a:ext cx="415531" cy="522669"/>
+                <a:xfrm rot="14220000">
+                  <a:off x="3209535" y="25746322"/>
+                  <a:ext cx="415532" cy="522669"/>
                 </a:xfrm>
                 <a:prstGeom prst="rect">
                   <a:avLst/>
@@ -5522,7 +5523,7 @@
               </p:blipFill>
               <p:spPr bwMode="auto">
                 <a:xfrm rot="1860000" flipV="1">
-                  <a:off x="2044458" y="24021492"/>
+                  <a:off x="2210891" y="24021670"/>
                   <a:ext cx="415531" cy="518915"/>
                 </a:xfrm>
                 <a:prstGeom prst="rect">
@@ -5567,7 +5568,7 @@
               </p:blipFill>
               <p:spPr bwMode="auto">
                 <a:xfrm rot="10682153">
-                  <a:off x="2071199" y="26563716"/>
+                  <a:off x="1996992" y="26846438"/>
                   <a:ext cx="647103" cy="461610"/>
                 </a:xfrm>
                 <a:prstGeom prst="rect">
@@ -5612,7 +5613,7 @@
               </p:blipFill>
               <p:spPr bwMode="auto">
                 <a:xfrm rot="5066743">
-                  <a:off x="3214576" y="24816684"/>
+                  <a:off x="3015526" y="26201102"/>
                   <a:ext cx="617122" cy="453037"/>
                 </a:xfrm>
                 <a:prstGeom prst="rect">
@@ -5874,7 +5875,7 @@
         </p:nvGrpSpPr>
         <p:grpSpPr>
           <a:xfrm>
-            <a:off x="4464501" y="58235"/>
+            <a:off x="5393997" y="409431"/>
             <a:ext cx="996634" cy="484586"/>
             <a:chOff x="4556878" y="0"/>
             <a:chExt cx="996634" cy="484586"/>
@@ -6081,7 +6082,7 @@
         </p:nvGrpSpPr>
         <p:grpSpPr>
           <a:xfrm>
-            <a:off x="3927535" y="1968993"/>
+            <a:off x="4796648" y="1684546"/>
             <a:ext cx="996634" cy="484586"/>
             <a:chOff x="4556878" y="0"/>
             <a:chExt cx="996634" cy="484586"/>
@@ -6780,7 +6781,7 @@
         </p:nvSpPr>
         <p:spPr>
           <a:xfrm>
-            <a:off x="5835627" y="2099012"/>
+            <a:off x="5947715" y="2229413"/>
             <a:ext cx="323454" cy="369332"/>
           </a:xfrm>
           <a:prstGeom prst="rect">
@@ -6802,10 +6803,1694 @@
           </a:p>
         </p:txBody>
       </p:sp>
+      <p:sp>
+        <p:nvSpPr>
+          <p:cNvPr id="2" name="TextBox 1">
+            <a:extLst>
+              <a:ext uri="{FF2B5EF4-FFF2-40B4-BE49-F238E27FC236}">
+                <a16:creationId xmlns:a16="http://schemas.microsoft.com/office/drawing/2014/main" id="{577EE755-82A8-4820-B7FC-E4B6364EDE23}"/>
+              </a:ext>
+            </a:extLst>
+          </p:cNvPr>
+          <p:cNvSpPr txBox="1"/>
+          <p:nvPr/>
+        </p:nvSpPr>
+        <p:spPr>
+          <a:xfrm>
+            <a:off x="975882" y="1458824"/>
+            <a:ext cx="561952" cy="261610"/>
+          </a:xfrm>
+          <a:prstGeom prst="rect">
+            <a:avLst/>
+          </a:prstGeom>
+          <a:noFill/>
+        </p:spPr>
+        <p:txBody>
+          <a:bodyPr wrap="square" rtlCol="0">
+            <a:spAutoFit/>
+          </a:bodyPr>
+          <a:lstStyle/>
+          <a:p>
+            <a:pPr algn="ctr"/>
+            <a:r>
+              <a:rPr lang="en-US" sz="1100" dirty="0">
+                <a:solidFill>
+                  <a:schemeClr val="bg1"/>
+                </a:solidFill>
+              </a:rPr>
+              <a:t>4.78m</a:t>
+            </a:r>
+            <a:endParaRPr lang="en-DE" sz="1100" dirty="0">
+              <a:solidFill>
+                <a:schemeClr val="bg1"/>
+              </a:solidFill>
+            </a:endParaRPr>
+          </a:p>
+        </p:txBody>
+      </p:sp>
+      <p:pic>
+        <p:nvPicPr>
+          <p:cNvPr id="20" name="Picture 19">
+            <a:extLst>
+              <a:ext uri="{FF2B5EF4-FFF2-40B4-BE49-F238E27FC236}">
+                <a16:creationId xmlns:a16="http://schemas.microsoft.com/office/drawing/2014/main" id="{2037847E-FB51-4426-BCCA-0330467B9C80}"/>
+              </a:ext>
+            </a:extLst>
+          </p:cNvPr>
+          <p:cNvPicPr>
+            <a:picLocks noChangeAspect="1"/>
+          </p:cNvPicPr>
+          <p:nvPr/>
+        </p:nvPicPr>
+        <p:blipFill>
+          <a:blip r:embed="rId6"/>
+          <a:stretch>
+            <a:fillRect/>
+          </a:stretch>
+        </p:blipFill>
+        <p:spPr>
+          <a:xfrm>
+            <a:off x="1831271" y="1672712"/>
+            <a:ext cx="361905" cy="171429"/>
+          </a:xfrm>
+          <a:prstGeom prst="rect">
+            <a:avLst/>
+          </a:prstGeom>
+        </p:spPr>
+      </p:pic>
+      <p:pic>
+        <p:nvPicPr>
+          <p:cNvPr id="39" name="Picture 38">
+            <a:extLst>
+              <a:ext uri="{FF2B5EF4-FFF2-40B4-BE49-F238E27FC236}">
+                <a16:creationId xmlns:a16="http://schemas.microsoft.com/office/drawing/2014/main" id="{E7F12DAB-3862-485A-AB52-600A29EE7455}"/>
+              </a:ext>
+            </a:extLst>
+          </p:cNvPr>
+          <p:cNvPicPr>
+            <a:picLocks noChangeAspect="1"/>
+          </p:cNvPicPr>
+          <p:nvPr/>
+        </p:nvPicPr>
+        <p:blipFill>
+          <a:blip r:embed="rId6"/>
+          <a:stretch>
+            <a:fillRect/>
+          </a:stretch>
+        </p:blipFill>
+        <p:spPr>
+          <a:xfrm>
+            <a:off x="2184195" y="1672711"/>
+            <a:ext cx="361905" cy="171429"/>
+          </a:xfrm>
+          <a:prstGeom prst="rect">
+            <a:avLst/>
+          </a:prstGeom>
+        </p:spPr>
+      </p:pic>
+      <p:pic>
+        <p:nvPicPr>
+          <p:cNvPr id="40" name="Picture 39">
+            <a:extLst>
+              <a:ext uri="{FF2B5EF4-FFF2-40B4-BE49-F238E27FC236}">
+                <a16:creationId xmlns:a16="http://schemas.microsoft.com/office/drawing/2014/main" id="{DE42FEBC-CDFB-4BC3-9277-5DC25505D067}"/>
+              </a:ext>
+            </a:extLst>
+          </p:cNvPr>
+          <p:cNvPicPr>
+            <a:picLocks noChangeAspect="1"/>
+          </p:cNvPicPr>
+          <p:nvPr/>
+        </p:nvPicPr>
+        <p:blipFill>
+          <a:blip r:embed="rId7"/>
+          <a:stretch>
+            <a:fillRect/>
+          </a:stretch>
+        </p:blipFill>
+        <p:spPr>
+          <a:xfrm>
+            <a:off x="2252664" y="2652208"/>
+            <a:ext cx="219878" cy="180952"/>
+          </a:xfrm>
+          <a:prstGeom prst="rect">
+            <a:avLst/>
+          </a:prstGeom>
+        </p:spPr>
+      </p:pic>
+      <p:pic>
+        <p:nvPicPr>
+          <p:cNvPr id="44" name="Picture 43">
+            <a:extLst>
+              <a:ext uri="{FF2B5EF4-FFF2-40B4-BE49-F238E27FC236}">
+                <a16:creationId xmlns:a16="http://schemas.microsoft.com/office/drawing/2014/main" id="{5E679C86-911B-4E57-A32C-193BC125FC71}"/>
+              </a:ext>
+            </a:extLst>
+          </p:cNvPr>
+          <p:cNvPicPr>
+            <a:picLocks noChangeAspect="1"/>
+          </p:cNvPicPr>
+          <p:nvPr/>
+        </p:nvPicPr>
+        <p:blipFill>
+          <a:blip r:embed="rId8"/>
+          <a:stretch>
+            <a:fillRect/>
+          </a:stretch>
+        </p:blipFill>
+        <p:spPr>
+          <a:xfrm>
+            <a:off x="2057011" y="2667026"/>
+            <a:ext cx="180952" cy="209524"/>
+          </a:xfrm>
+          <a:prstGeom prst="rect">
+            <a:avLst/>
+          </a:prstGeom>
+        </p:spPr>
+      </p:pic>
+      <p:pic>
+        <p:nvPicPr>
+          <p:cNvPr id="45" name="Picture 44">
+            <a:extLst>
+              <a:ext uri="{FF2B5EF4-FFF2-40B4-BE49-F238E27FC236}">
+                <a16:creationId xmlns:a16="http://schemas.microsoft.com/office/drawing/2014/main" id="{78389429-FAE5-41E1-9671-B20F1A5C115C}"/>
+              </a:ext>
+            </a:extLst>
+          </p:cNvPr>
+          <p:cNvPicPr>
+            <a:picLocks noChangeAspect="1"/>
+          </p:cNvPicPr>
+          <p:nvPr/>
+        </p:nvPicPr>
+        <p:blipFill>
+          <a:blip r:embed="rId8"/>
+          <a:stretch>
+            <a:fillRect/>
+          </a:stretch>
+        </p:blipFill>
+        <p:spPr>
+          <a:xfrm>
+            <a:off x="2472541" y="2637922"/>
+            <a:ext cx="180952" cy="209524"/>
+          </a:xfrm>
+          <a:prstGeom prst="rect">
+            <a:avLst/>
+          </a:prstGeom>
+        </p:spPr>
+      </p:pic>
+      <p:cxnSp>
+        <p:nvCxnSpPr>
+          <p:cNvPr id="34" name="Straight Connector 33">
+            <a:extLst>
+              <a:ext uri="{FF2B5EF4-FFF2-40B4-BE49-F238E27FC236}">
+                <a16:creationId xmlns:a16="http://schemas.microsoft.com/office/drawing/2014/main" id="{DC64432C-5376-491F-A917-96AF7CEF78CE}"/>
+              </a:ext>
+            </a:extLst>
+          </p:cNvPr>
+          <p:cNvCxnSpPr>
+            <a:cxnSpLocks/>
+          </p:cNvCxnSpPr>
+          <p:nvPr/>
+        </p:nvCxnSpPr>
+        <p:spPr>
+          <a:xfrm>
+            <a:off x="2132596" y="737010"/>
+            <a:ext cx="120067" cy="2144303"/>
+          </a:xfrm>
+          <a:prstGeom prst="line">
+            <a:avLst/>
+          </a:prstGeom>
+          <a:ln w="19050">
+            <a:solidFill>
+              <a:schemeClr val="bg1">
+                <a:lumMod val="95000"/>
+              </a:schemeClr>
+            </a:solidFill>
+          </a:ln>
+        </p:spPr>
+        <p:style>
+          <a:lnRef idx="1">
+            <a:schemeClr val="accent1"/>
+          </a:lnRef>
+          <a:fillRef idx="0">
+            <a:schemeClr val="accent1"/>
+          </a:fillRef>
+          <a:effectRef idx="0">
+            <a:schemeClr val="accent1"/>
+          </a:effectRef>
+          <a:fontRef idx="minor">
+            <a:schemeClr val="tx1"/>
+          </a:fontRef>
+        </p:style>
+      </p:cxnSp>
+      <p:cxnSp>
+        <p:nvCxnSpPr>
+          <p:cNvPr id="46" name="Straight Connector 45">
+            <a:extLst>
+              <a:ext uri="{FF2B5EF4-FFF2-40B4-BE49-F238E27FC236}">
+                <a16:creationId xmlns:a16="http://schemas.microsoft.com/office/drawing/2014/main" id="{3DCA896F-69E4-4FB9-AAE0-96F35C7C25A7}"/>
+              </a:ext>
+            </a:extLst>
+          </p:cNvPr>
+          <p:cNvCxnSpPr>
+            <a:cxnSpLocks/>
+          </p:cNvCxnSpPr>
+          <p:nvPr/>
+        </p:nvCxnSpPr>
+        <p:spPr>
+          <a:xfrm flipH="1">
+            <a:off x="700089" y="1536605"/>
+            <a:ext cx="2590964" cy="176760"/>
+          </a:xfrm>
+          <a:prstGeom prst="line">
+            <a:avLst/>
+          </a:prstGeom>
+          <a:ln w="19050">
+            <a:solidFill>
+              <a:schemeClr val="bg1">
+                <a:lumMod val="95000"/>
+              </a:schemeClr>
+            </a:solidFill>
+          </a:ln>
+        </p:spPr>
+        <p:style>
+          <a:lnRef idx="1">
+            <a:schemeClr val="accent1"/>
+          </a:lnRef>
+          <a:fillRef idx="0">
+            <a:schemeClr val="accent1"/>
+          </a:fillRef>
+          <a:effectRef idx="0">
+            <a:schemeClr val="accent1"/>
+          </a:effectRef>
+          <a:fontRef idx="minor">
+            <a:schemeClr val="tx1"/>
+          </a:fontRef>
+        </p:style>
+      </p:cxnSp>
+      <p:pic>
+        <p:nvPicPr>
+          <p:cNvPr id="53" name="Picture 52">
+            <a:extLst>
+              <a:ext uri="{FF2B5EF4-FFF2-40B4-BE49-F238E27FC236}">
+                <a16:creationId xmlns:a16="http://schemas.microsoft.com/office/drawing/2014/main" id="{5BC7ADB3-E1FA-4C03-A383-D0727E97D09A}"/>
+              </a:ext>
+            </a:extLst>
+          </p:cNvPr>
+          <p:cNvPicPr>
+            <a:picLocks noChangeAspect="1"/>
+          </p:cNvPicPr>
+          <p:nvPr/>
+        </p:nvPicPr>
+        <p:blipFill>
+          <a:blip r:embed="rId9"/>
+          <a:stretch>
+            <a:fillRect/>
+          </a:stretch>
+        </p:blipFill>
+        <p:spPr>
+          <a:xfrm>
+            <a:off x="2463297" y="2365549"/>
+            <a:ext cx="209524" cy="123810"/>
+          </a:xfrm>
+          <a:prstGeom prst="rect">
+            <a:avLst/>
+          </a:prstGeom>
+        </p:spPr>
+      </p:pic>
+      <p:pic>
+        <p:nvPicPr>
+          <p:cNvPr id="54" name="Picture 53">
+            <a:extLst>
+              <a:ext uri="{FF2B5EF4-FFF2-40B4-BE49-F238E27FC236}">
+                <a16:creationId xmlns:a16="http://schemas.microsoft.com/office/drawing/2014/main" id="{83E20CAC-C93B-4617-9DE2-09D61422488D}"/>
+              </a:ext>
+            </a:extLst>
+          </p:cNvPr>
+          <p:cNvPicPr>
+            <a:picLocks noChangeAspect="1"/>
+          </p:cNvPicPr>
+          <p:nvPr/>
+        </p:nvPicPr>
+        <p:blipFill>
+          <a:blip r:embed="rId9"/>
+          <a:stretch>
+            <a:fillRect/>
+          </a:stretch>
+        </p:blipFill>
+        <p:spPr>
+          <a:xfrm rot="10800000">
+            <a:off x="2458255" y="2468729"/>
+            <a:ext cx="209524" cy="134259"/>
+          </a:xfrm>
+          <a:prstGeom prst="rect">
+            <a:avLst/>
+          </a:prstGeom>
+        </p:spPr>
+      </p:pic>
+      <p:pic>
+        <p:nvPicPr>
+          <p:cNvPr id="55" name="Picture 54">
+            <a:extLst>
+              <a:ext uri="{FF2B5EF4-FFF2-40B4-BE49-F238E27FC236}">
+                <a16:creationId xmlns:a16="http://schemas.microsoft.com/office/drawing/2014/main" id="{156D784A-F62C-4D54-81FD-49A1DAF56F3B}"/>
+              </a:ext>
+            </a:extLst>
+          </p:cNvPr>
+          <p:cNvPicPr>
+            <a:picLocks noChangeAspect="1"/>
+          </p:cNvPicPr>
+          <p:nvPr/>
+        </p:nvPicPr>
+        <p:blipFill>
+          <a:blip r:embed="rId9"/>
+          <a:stretch>
+            <a:fillRect/>
+          </a:stretch>
+        </p:blipFill>
+        <p:spPr>
+          <a:xfrm rot="10800000">
+            <a:off x="2272549" y="2334470"/>
+            <a:ext cx="209524" cy="134259"/>
+          </a:xfrm>
+          <a:prstGeom prst="rect">
+            <a:avLst/>
+          </a:prstGeom>
+        </p:spPr>
+      </p:pic>
+      <p:pic>
+        <p:nvPicPr>
+          <p:cNvPr id="56" name="Picture 55">
+            <a:extLst>
+              <a:ext uri="{FF2B5EF4-FFF2-40B4-BE49-F238E27FC236}">
+                <a16:creationId xmlns:a16="http://schemas.microsoft.com/office/drawing/2014/main" id="{30D1F6B8-C06F-472C-B068-2EBC4607D8B5}"/>
+              </a:ext>
+            </a:extLst>
+          </p:cNvPr>
+          <p:cNvPicPr>
+            <a:picLocks noChangeAspect="1"/>
+          </p:cNvPicPr>
+          <p:nvPr/>
+        </p:nvPicPr>
+        <p:blipFill>
+          <a:blip r:embed="rId9"/>
+          <a:stretch>
+            <a:fillRect/>
+          </a:stretch>
+        </p:blipFill>
+        <p:spPr>
+          <a:xfrm>
+            <a:off x="2272549" y="2465959"/>
+            <a:ext cx="209524" cy="123810"/>
+          </a:xfrm>
+          <a:prstGeom prst="rect">
+            <a:avLst/>
+          </a:prstGeom>
+        </p:spPr>
+      </p:pic>
+      <p:pic>
+        <p:nvPicPr>
+          <p:cNvPr id="57" name="Picture 56">
+            <a:extLst>
+              <a:ext uri="{FF2B5EF4-FFF2-40B4-BE49-F238E27FC236}">
+                <a16:creationId xmlns:a16="http://schemas.microsoft.com/office/drawing/2014/main" id="{8D916DF7-B307-4D21-A041-47CDBA79BF62}"/>
+              </a:ext>
+            </a:extLst>
+          </p:cNvPr>
+          <p:cNvPicPr>
+            <a:picLocks noChangeAspect="1"/>
+          </p:cNvPicPr>
+          <p:nvPr/>
+        </p:nvPicPr>
+        <p:blipFill>
+          <a:blip r:embed="rId10"/>
+          <a:stretch>
+            <a:fillRect/>
+          </a:stretch>
+        </p:blipFill>
+        <p:spPr>
+          <a:xfrm>
+            <a:off x="1660337" y="1470580"/>
+            <a:ext cx="504762" cy="114286"/>
+          </a:xfrm>
+          <a:prstGeom prst="rect">
+            <a:avLst/>
+          </a:prstGeom>
+        </p:spPr>
+      </p:pic>
+      <p:cxnSp>
+        <p:nvCxnSpPr>
+          <p:cNvPr id="58" name="Straight Connector 57">
+            <a:extLst>
+              <a:ext uri="{FF2B5EF4-FFF2-40B4-BE49-F238E27FC236}">
+                <a16:creationId xmlns:a16="http://schemas.microsoft.com/office/drawing/2014/main" id="{EA4C110B-F608-4EF8-BB40-D224CDC7EDAE}"/>
+              </a:ext>
+            </a:extLst>
+          </p:cNvPr>
+          <p:cNvCxnSpPr>
+            <a:cxnSpLocks/>
+          </p:cNvCxnSpPr>
+          <p:nvPr/>
+        </p:nvCxnSpPr>
+        <p:spPr>
+          <a:xfrm flipH="1" flipV="1">
+            <a:off x="2458256" y="2251756"/>
+            <a:ext cx="9243" cy="658132"/>
+          </a:xfrm>
+          <a:prstGeom prst="line">
+            <a:avLst/>
+          </a:prstGeom>
+          <a:ln w="19050">
+            <a:solidFill>
+              <a:schemeClr val="bg1">
+                <a:lumMod val="95000"/>
+              </a:schemeClr>
+            </a:solidFill>
+          </a:ln>
+        </p:spPr>
+        <p:style>
+          <a:lnRef idx="1">
+            <a:schemeClr val="accent1"/>
+          </a:lnRef>
+          <a:fillRef idx="0">
+            <a:schemeClr val="accent1"/>
+          </a:fillRef>
+          <a:effectRef idx="0">
+            <a:schemeClr val="accent1"/>
+          </a:effectRef>
+          <a:fontRef idx="minor">
+            <a:schemeClr val="tx1"/>
+          </a:fontRef>
+        </p:style>
+      </p:cxnSp>
+      <p:cxnSp>
+        <p:nvCxnSpPr>
+          <p:cNvPr id="66" name="Straight Connector 65">
+            <a:extLst>
+              <a:ext uri="{FF2B5EF4-FFF2-40B4-BE49-F238E27FC236}">
+                <a16:creationId xmlns:a16="http://schemas.microsoft.com/office/drawing/2014/main" id="{6D8E6373-A040-4C6A-828A-F98D6A6DE083}"/>
+              </a:ext>
+            </a:extLst>
+          </p:cNvPr>
+          <p:cNvCxnSpPr>
+            <a:cxnSpLocks/>
+          </p:cNvCxnSpPr>
+          <p:nvPr/>
+        </p:nvCxnSpPr>
+        <p:spPr>
+          <a:xfrm>
+            <a:off x="1932316" y="2802731"/>
+            <a:ext cx="820409" cy="73819"/>
+          </a:xfrm>
+          <a:prstGeom prst="line">
+            <a:avLst/>
+          </a:prstGeom>
+          <a:ln w="19050">
+            <a:solidFill>
+              <a:schemeClr val="bg1">
+                <a:lumMod val="95000"/>
+              </a:schemeClr>
+            </a:solidFill>
+          </a:ln>
+        </p:spPr>
+        <p:style>
+          <a:lnRef idx="1">
+            <a:schemeClr val="accent1"/>
+          </a:lnRef>
+          <a:fillRef idx="0">
+            <a:schemeClr val="accent1"/>
+          </a:fillRef>
+          <a:effectRef idx="0">
+            <a:schemeClr val="accent1"/>
+          </a:effectRef>
+          <a:fontRef idx="minor">
+            <a:schemeClr val="tx1"/>
+          </a:fontRef>
+        </p:style>
+      </p:cxnSp>
+      <p:sp>
+        <p:nvSpPr>
+          <p:cNvPr id="70" name="TextBox 69">
+            <a:extLst>
+              <a:ext uri="{FF2B5EF4-FFF2-40B4-BE49-F238E27FC236}">
+                <a16:creationId xmlns:a16="http://schemas.microsoft.com/office/drawing/2014/main" id="{36D5E73B-D6B0-471E-9049-E8DC16A86F5A}"/>
+              </a:ext>
+            </a:extLst>
+          </p:cNvPr>
+          <p:cNvSpPr txBox="1"/>
+          <p:nvPr/>
+        </p:nvSpPr>
+        <p:spPr>
+          <a:xfrm rot="16200000">
+            <a:off x="1760209" y="843273"/>
+            <a:ext cx="561952" cy="261610"/>
+          </a:xfrm>
+          <a:prstGeom prst="rect">
+            <a:avLst/>
+          </a:prstGeom>
+          <a:noFill/>
+        </p:spPr>
+        <p:txBody>
+          <a:bodyPr wrap="square" rtlCol="0">
+            <a:spAutoFit/>
+          </a:bodyPr>
+          <a:lstStyle/>
+          <a:p>
+            <a:pPr algn="ctr"/>
+            <a:r>
+              <a:rPr lang="en-US" sz="1100" dirty="0">
+                <a:solidFill>
+                  <a:schemeClr val="bg1"/>
+                </a:solidFill>
+              </a:rPr>
+              <a:t>4.24m</a:t>
+            </a:r>
+            <a:endParaRPr lang="en-DE" sz="1100" dirty="0">
+              <a:solidFill>
+                <a:schemeClr val="bg1"/>
+              </a:solidFill>
+            </a:endParaRPr>
+          </a:p>
+        </p:txBody>
+      </p:sp>
+      <p:sp>
+        <p:nvSpPr>
+          <p:cNvPr id="71" name="TextBox 70">
+            <a:extLst>
+              <a:ext uri="{FF2B5EF4-FFF2-40B4-BE49-F238E27FC236}">
+                <a16:creationId xmlns:a16="http://schemas.microsoft.com/office/drawing/2014/main" id="{98A388D5-9387-4593-B464-727008F6B5F8}"/>
+              </a:ext>
+            </a:extLst>
+          </p:cNvPr>
+          <p:cNvSpPr txBox="1"/>
+          <p:nvPr/>
+        </p:nvSpPr>
+        <p:spPr>
+          <a:xfrm rot="16200000">
+            <a:off x="2264959" y="2270795"/>
+            <a:ext cx="561952" cy="261610"/>
+          </a:xfrm>
+          <a:prstGeom prst="rect">
+            <a:avLst/>
+          </a:prstGeom>
+          <a:noFill/>
+        </p:spPr>
+        <p:txBody>
+          <a:bodyPr wrap="square" rtlCol="0">
+            <a:spAutoFit/>
+          </a:bodyPr>
+          <a:lstStyle/>
+          <a:p>
+            <a:pPr algn="ctr"/>
+            <a:r>
+              <a:rPr lang="en-US" sz="1100" dirty="0">
+                <a:solidFill>
+                  <a:schemeClr val="bg1"/>
+                </a:solidFill>
+              </a:rPr>
+              <a:t>1.90m</a:t>
+            </a:r>
+            <a:endParaRPr lang="en-DE" sz="1100" dirty="0">
+              <a:solidFill>
+                <a:schemeClr val="bg1"/>
+              </a:solidFill>
+            </a:endParaRPr>
+          </a:p>
+        </p:txBody>
+      </p:sp>
+      <p:sp>
+        <p:nvSpPr>
+          <p:cNvPr id="75" name="TextBox 74">
+            <a:extLst>
+              <a:ext uri="{FF2B5EF4-FFF2-40B4-BE49-F238E27FC236}">
+                <a16:creationId xmlns:a16="http://schemas.microsoft.com/office/drawing/2014/main" id="{26DE459F-E37A-4826-95C7-45908996588E}"/>
+              </a:ext>
+            </a:extLst>
+          </p:cNvPr>
+          <p:cNvSpPr txBox="1"/>
+          <p:nvPr/>
+        </p:nvSpPr>
+        <p:spPr>
+          <a:xfrm>
+            <a:off x="1286222" y="2672710"/>
+            <a:ext cx="561952" cy="261610"/>
+          </a:xfrm>
+          <a:prstGeom prst="rect">
+            <a:avLst/>
+          </a:prstGeom>
+          <a:noFill/>
+        </p:spPr>
+        <p:txBody>
+          <a:bodyPr wrap="square" rtlCol="0">
+            <a:spAutoFit/>
+          </a:bodyPr>
+          <a:lstStyle/>
+          <a:p>
+            <a:pPr algn="ctr"/>
+            <a:r>
+              <a:rPr lang="en-US" sz="1100" dirty="0">
+                <a:solidFill>
+                  <a:schemeClr val="bg1"/>
+                </a:solidFill>
+              </a:rPr>
+              <a:t>1.60m</a:t>
+            </a:r>
+            <a:endParaRPr lang="en-DE" sz="1100" dirty="0">
+              <a:solidFill>
+                <a:schemeClr val="bg1"/>
+              </a:solidFill>
+            </a:endParaRPr>
+          </a:p>
+        </p:txBody>
+      </p:sp>
     </p:spTree>
     <p:extLst>
       <p:ext uri="{BB962C8B-B14F-4D97-AF65-F5344CB8AC3E}">
         <p14:creationId xmlns:p14="http://schemas.microsoft.com/office/powerpoint/2010/main" val="3210516829"/>
+      </p:ext>
+    </p:extLst>
+  </p:cSld>
+  <p:clrMapOvr>
+    <a:masterClrMapping/>
+  </p:clrMapOvr>
+</p:sld>
+</file>
+
+<file path=ppt/slides/slide3.xml><?xml version="1.0" encoding="utf-8"?>
+<p:sld xmlns:a="http://schemas.openxmlformats.org/drawingml/2006/main" xmlns:r="http://schemas.openxmlformats.org/officeDocument/2006/relationships" xmlns:p="http://schemas.openxmlformats.org/presentationml/2006/main">
+  <p:cSld>
+    <p:spTree>
+      <p:nvGrpSpPr>
+        <p:cNvPr id="1" name=""/>
+        <p:cNvGrpSpPr/>
+        <p:nvPr/>
+      </p:nvGrpSpPr>
+      <p:grpSpPr>
+        <a:xfrm>
+          <a:off x="0" y="0"/>
+          <a:ext cx="0" cy="0"/>
+          <a:chOff x="0" y="0"/>
+          <a:chExt cx="0" cy="0"/>
+        </a:xfrm>
+      </p:grpSpPr>
+      <p:grpSp>
+        <p:nvGrpSpPr>
+          <p:cNvPr id="37" name="Group 36">
+            <a:extLst>
+              <a:ext uri="{FF2B5EF4-FFF2-40B4-BE49-F238E27FC236}">
+                <a16:creationId xmlns:a16="http://schemas.microsoft.com/office/drawing/2014/main" id="{8E66D9E5-E250-48B7-AED2-EB4DFB3D316C}"/>
+              </a:ext>
+            </a:extLst>
+          </p:cNvPr>
+          <p:cNvGrpSpPr/>
+          <p:nvPr/>
+        </p:nvGrpSpPr>
+        <p:grpSpPr>
+          <a:xfrm>
+            <a:off x="-260120" y="0"/>
+            <a:ext cx="8832957" cy="6521449"/>
+            <a:chOff x="1168630" y="0"/>
+            <a:chExt cx="8832957" cy="6521449"/>
+          </a:xfrm>
+        </p:grpSpPr>
+        <p:pic>
+          <p:nvPicPr>
+            <p:cNvPr id="4" name="Picture 3">
+              <a:extLst>
+                <a:ext uri="{FF2B5EF4-FFF2-40B4-BE49-F238E27FC236}">
+                  <a16:creationId xmlns:a16="http://schemas.microsoft.com/office/drawing/2014/main" id="{94DB5BAB-3BD2-4FE3-82FF-EE3634448C3E}"/>
+                </a:ext>
+              </a:extLst>
+            </p:cNvPr>
+            <p:cNvPicPr>
+              <a:picLocks noChangeAspect="1"/>
+            </p:cNvPicPr>
+            <p:nvPr/>
+          </p:nvPicPr>
+          <p:blipFill>
+            <a:blip r:embed="rId2">
+              <a:extLst>
+                <a:ext uri="{28A0092B-C50C-407E-A947-70E740481C1C}">
+                  <a14:useLocalDpi xmlns:a14="http://schemas.microsoft.com/office/drawing/2010/main" val="0"/>
+                </a:ext>
+              </a:extLst>
+            </a:blip>
+            <a:stretch>
+              <a:fillRect/>
+            </a:stretch>
+          </p:blipFill>
+          <p:spPr>
+            <a:xfrm>
+              <a:off x="3608275" y="5556249"/>
+              <a:ext cx="2175099" cy="965200"/>
+            </a:xfrm>
+            <a:prstGeom prst="rect">
+              <a:avLst/>
+            </a:prstGeom>
+          </p:spPr>
+        </p:pic>
+        <p:pic>
+          <p:nvPicPr>
+            <p:cNvPr id="5" name="Picture 4">
+              <a:extLst>
+                <a:ext uri="{FF2B5EF4-FFF2-40B4-BE49-F238E27FC236}">
+                  <a16:creationId xmlns:a16="http://schemas.microsoft.com/office/drawing/2014/main" id="{C785C96D-D98F-44A4-920F-8788C1F3E014}"/>
+                </a:ext>
+              </a:extLst>
+            </p:cNvPr>
+            <p:cNvPicPr>
+              <a:picLocks noChangeAspect="1"/>
+            </p:cNvPicPr>
+            <p:nvPr/>
+          </p:nvPicPr>
+          <p:blipFill>
+            <a:blip r:embed="rId2">
+              <a:extLst>
+                <a:ext uri="{28A0092B-C50C-407E-A947-70E740481C1C}">
+                  <a14:useLocalDpi xmlns:a14="http://schemas.microsoft.com/office/drawing/2010/main" val="0"/>
+                </a:ext>
+              </a:extLst>
+            </a:blip>
+            <a:stretch>
+              <a:fillRect/>
+            </a:stretch>
+          </p:blipFill>
+          <p:spPr>
+            <a:xfrm>
+              <a:off x="3608275" y="336549"/>
+              <a:ext cx="2175099" cy="965200"/>
+            </a:xfrm>
+            <a:prstGeom prst="rect">
+              <a:avLst/>
+            </a:prstGeom>
+          </p:spPr>
+        </p:pic>
+        <p:pic>
+          <p:nvPicPr>
+            <p:cNvPr id="6" name="Picture 5" descr="Image result for microphone cartoons">
+              <a:extLst>
+                <a:ext uri="{FF2B5EF4-FFF2-40B4-BE49-F238E27FC236}">
+                  <a16:creationId xmlns:a16="http://schemas.microsoft.com/office/drawing/2014/main" id="{1434F020-EA6A-4698-A207-1C655858CFDB}"/>
+                </a:ext>
+              </a:extLst>
+            </p:cNvPr>
+            <p:cNvPicPr>
+              <a:picLocks noChangeAspect="1" noChangeArrowheads="1"/>
+            </p:cNvPicPr>
+            <p:nvPr/>
+          </p:nvPicPr>
+          <p:blipFill rotWithShape="1">
+            <a:blip r:embed="rId3" cstate="print">
+              <a:extLst>
+                <a:ext uri="{28A0092B-C50C-407E-A947-70E740481C1C}">
+                  <a14:useLocalDpi xmlns:a14="http://schemas.microsoft.com/office/drawing/2010/main" val="0"/>
+                </a:ext>
+              </a:extLst>
+            </a:blip>
+            <a:srcRect b="5662"/>
+            <a:stretch/>
+          </p:blipFill>
+          <p:spPr bwMode="auto">
+            <a:xfrm rot="3438442">
+              <a:off x="1643253" y="2945605"/>
+              <a:ext cx="359526" cy="431272"/>
+            </a:xfrm>
+            <a:prstGeom prst="rect">
+              <a:avLst/>
+            </a:prstGeom>
+            <a:noFill/>
+            <a:extLst>
+              <a:ext uri="{909E8E84-426E-40DD-AFC4-6F175D3DCCD1}">
+                <a14:hiddenFill xmlns:a14="http://schemas.microsoft.com/office/drawing/2010/main">
+                  <a:solidFill>
+                    <a:srgbClr val="FFFFFF"/>
+                  </a:solidFill>
+                </a14:hiddenFill>
+              </a:ext>
+            </a:extLst>
+          </p:spPr>
+        </p:pic>
+        <p:cxnSp>
+          <p:nvCxnSpPr>
+            <p:cNvPr id="8" name="Straight Arrow Connector 7">
+              <a:extLst>
+                <a:ext uri="{FF2B5EF4-FFF2-40B4-BE49-F238E27FC236}">
+                  <a16:creationId xmlns:a16="http://schemas.microsoft.com/office/drawing/2014/main" id="{4CE3FDAE-DA30-4767-8730-110A19C3F144}"/>
+                </a:ext>
+              </a:extLst>
+            </p:cNvPr>
+            <p:cNvCxnSpPr/>
+            <p:nvPr/>
+          </p:nvCxnSpPr>
+          <p:spPr>
+            <a:xfrm flipH="1">
+              <a:off x="2101587" y="1057274"/>
+              <a:ext cx="2070363" cy="1981200"/>
+            </a:xfrm>
+            <a:prstGeom prst="straightConnector1">
+              <a:avLst/>
+            </a:prstGeom>
+            <a:ln w="38100">
+              <a:solidFill>
+                <a:srgbClr val="FF0000"/>
+              </a:solidFill>
+              <a:tailEnd type="triangle"/>
+            </a:ln>
+          </p:spPr>
+          <p:style>
+            <a:lnRef idx="1">
+              <a:schemeClr val="accent1"/>
+            </a:lnRef>
+            <a:fillRef idx="0">
+              <a:schemeClr val="accent1"/>
+            </a:fillRef>
+            <a:effectRef idx="0">
+              <a:schemeClr val="accent1"/>
+            </a:effectRef>
+            <a:fontRef idx="minor">
+              <a:schemeClr val="tx1"/>
+            </a:fontRef>
+          </p:style>
+        </p:cxnSp>
+        <p:cxnSp>
+          <p:nvCxnSpPr>
+            <p:cNvPr id="9" name="Straight Arrow Connector 8">
+              <a:extLst>
+                <a:ext uri="{FF2B5EF4-FFF2-40B4-BE49-F238E27FC236}">
+                  <a16:creationId xmlns:a16="http://schemas.microsoft.com/office/drawing/2014/main" id="{2DF64A54-7007-4A8C-A72C-DC257BF6884B}"/>
+                </a:ext>
+              </a:extLst>
+            </p:cNvPr>
+            <p:cNvCxnSpPr>
+              <a:cxnSpLocks/>
+            </p:cNvCxnSpPr>
+            <p:nvPr/>
+          </p:nvCxnSpPr>
+          <p:spPr>
+            <a:xfrm flipH="1" flipV="1">
+              <a:off x="2181225" y="3276599"/>
+              <a:ext cx="2152651" cy="2279651"/>
+            </a:xfrm>
+            <a:prstGeom prst="straightConnector1">
+              <a:avLst/>
+            </a:prstGeom>
+            <a:ln w="38100">
+              <a:solidFill>
+                <a:srgbClr val="FF0000"/>
+              </a:solidFill>
+              <a:tailEnd type="triangle"/>
+            </a:ln>
+          </p:spPr>
+          <p:style>
+            <a:lnRef idx="1">
+              <a:schemeClr val="accent1"/>
+            </a:lnRef>
+            <a:fillRef idx="0">
+              <a:schemeClr val="accent1"/>
+            </a:fillRef>
+            <a:effectRef idx="0">
+              <a:schemeClr val="accent1"/>
+            </a:effectRef>
+            <a:fontRef idx="minor">
+              <a:schemeClr val="tx1"/>
+            </a:fontRef>
+          </p:style>
+        </p:cxnSp>
+        <p:cxnSp>
+          <p:nvCxnSpPr>
+            <p:cNvPr id="13" name="Straight Arrow Connector 12">
+              <a:extLst>
+                <a:ext uri="{FF2B5EF4-FFF2-40B4-BE49-F238E27FC236}">
+                  <a16:creationId xmlns:a16="http://schemas.microsoft.com/office/drawing/2014/main" id="{4B2E250B-38AE-472F-AA99-C7C660B0A228}"/>
+                </a:ext>
+              </a:extLst>
+            </p:cNvPr>
+            <p:cNvCxnSpPr>
+              <a:stCxn id="4" idx="0"/>
+              <a:endCxn id="5" idx="2"/>
+            </p:cNvCxnSpPr>
+            <p:nvPr/>
+          </p:nvCxnSpPr>
+          <p:spPr>
+            <a:xfrm flipV="1">
+              <a:off x="4695825" y="1301749"/>
+              <a:ext cx="0" cy="4254500"/>
+            </a:xfrm>
+            <a:prstGeom prst="straightConnector1">
+              <a:avLst/>
+            </a:prstGeom>
+            <a:ln w="38100">
+              <a:solidFill>
+                <a:schemeClr val="tx1"/>
+              </a:solidFill>
+              <a:prstDash val="sysDash"/>
+              <a:tailEnd type="triangle"/>
+            </a:ln>
+          </p:spPr>
+          <p:style>
+            <a:lnRef idx="1">
+              <a:schemeClr val="accent1"/>
+            </a:lnRef>
+            <a:fillRef idx="0">
+              <a:schemeClr val="accent1"/>
+            </a:fillRef>
+            <a:effectRef idx="0">
+              <a:schemeClr val="accent1"/>
+            </a:effectRef>
+            <a:fontRef idx="minor">
+              <a:schemeClr val="tx1"/>
+            </a:fontRef>
+          </p:style>
+        </p:cxnSp>
+        <p:sp>
+          <p:nvSpPr>
+            <p:cNvPr id="14" name="TextBox 13">
+              <a:extLst>
+                <a:ext uri="{FF2B5EF4-FFF2-40B4-BE49-F238E27FC236}">
+                  <a16:creationId xmlns:a16="http://schemas.microsoft.com/office/drawing/2014/main" id="{F1C06682-6770-47DF-B073-68A3799D29B0}"/>
+                </a:ext>
+              </a:extLst>
+            </p:cNvPr>
+            <p:cNvSpPr txBox="1"/>
+            <p:nvPr/>
+          </p:nvSpPr>
+          <p:spPr>
+            <a:xfrm>
+              <a:off x="5890462" y="0"/>
+              <a:ext cx="3933825" cy="1938992"/>
+            </a:xfrm>
+            <a:prstGeom prst="rect">
+              <a:avLst/>
+            </a:prstGeom>
+            <a:noFill/>
+          </p:spPr>
+          <p:txBody>
+            <a:bodyPr wrap="square" rtlCol="0">
+              <a:spAutoFit/>
+            </a:bodyPr>
+            <a:lstStyle/>
+            <a:p>
+              <a:r>
+                <a:rPr lang="en-US" sz="2400" i="1" dirty="0" err="1"/>
+                <a:t>F</a:t>
+              </a:r>
+              <a:r>
+                <a:rPr lang="en-US" sz="2400" i="1" baseline="-25000" dirty="0" err="1"/>
+                <a:t>o</a:t>
+              </a:r>
+              <a:r>
+                <a:rPr lang="en-US" sz="2400" dirty="0"/>
+                <a:t>: Acoustic fovea frequency</a:t>
+              </a:r>
+            </a:p>
+            <a:p>
+              <a:r>
+                <a:rPr lang="en-US" sz="2400" i="1" dirty="0" err="1"/>
+                <a:t>F</a:t>
+              </a:r>
+              <a:r>
+                <a:rPr lang="en-US" sz="2400" i="1" baseline="-25000" dirty="0" err="1"/>
+                <a:t>emit</a:t>
+              </a:r>
+              <a:r>
+                <a:rPr lang="en-US" sz="2400" dirty="0"/>
+                <a:t>: Emitted frequency</a:t>
+              </a:r>
+            </a:p>
+            <a:p>
+              <a:r>
+                <a:rPr lang="en-US" sz="2400" i="1" dirty="0" err="1"/>
+                <a:t>F</a:t>
+              </a:r>
+              <a:r>
+                <a:rPr lang="en-US" sz="2400" i="1" baseline="-25000" dirty="0" err="1"/>
+                <a:t>rec</a:t>
+              </a:r>
+              <a:r>
+                <a:rPr lang="en-US" sz="2400" dirty="0"/>
+                <a:t>:</a:t>
+              </a:r>
+              <a:r>
+                <a:rPr lang="en-US" sz="2400" i="1" dirty="0"/>
+                <a:t> </a:t>
+              </a:r>
+              <a:r>
+                <a:rPr lang="en-US" sz="2400" dirty="0"/>
+                <a:t>Recorded frequency</a:t>
+              </a:r>
+            </a:p>
+            <a:p>
+              <a:r>
+                <a:rPr lang="en-US" sz="2400" i="1" dirty="0"/>
+                <a:t>v</a:t>
+              </a:r>
+              <a:r>
+                <a:rPr lang="en-US" sz="2400" dirty="0"/>
+                <a:t>:</a:t>
+              </a:r>
+              <a:r>
+                <a:rPr lang="en-US" sz="2400" i="1" dirty="0"/>
+                <a:t> Flight speed </a:t>
+              </a:r>
+            </a:p>
+            <a:p>
+              <a:r>
+                <a:rPr lang="el-GR" sz="2400" dirty="0"/>
+                <a:t>θ</a:t>
+              </a:r>
+              <a:r>
+                <a:rPr lang="en-US" sz="2400" dirty="0"/>
+                <a:t>: Relative angle to mic</a:t>
+              </a:r>
+              <a:endParaRPr lang="en-DE" sz="2400" i="1" dirty="0"/>
+            </a:p>
+          </p:txBody>
+        </p:sp>
+        <p:sp>
+          <p:nvSpPr>
+            <p:cNvPr id="15" name="TextBox 14">
+              <a:extLst>
+                <a:ext uri="{FF2B5EF4-FFF2-40B4-BE49-F238E27FC236}">
+                  <a16:creationId xmlns:a16="http://schemas.microsoft.com/office/drawing/2014/main" id="{65C07213-50EA-481C-9EEA-0B538938FF14}"/>
+                </a:ext>
+              </a:extLst>
+            </p:cNvPr>
+            <p:cNvSpPr txBox="1"/>
+            <p:nvPr/>
+          </p:nvSpPr>
+          <p:spPr>
+            <a:xfrm>
+              <a:off x="4695824" y="5177909"/>
+              <a:ext cx="925608" cy="369332"/>
+            </a:xfrm>
+            <a:prstGeom prst="rect">
+              <a:avLst/>
+            </a:prstGeom>
+            <a:noFill/>
+          </p:spPr>
+          <p:txBody>
+            <a:bodyPr wrap="square" rtlCol="0">
+              <a:spAutoFit/>
+            </a:bodyPr>
+            <a:lstStyle/>
+            <a:p>
+              <a:r>
+                <a:rPr lang="en-US" i="1" dirty="0" err="1"/>
+                <a:t>v</a:t>
+              </a:r>
+              <a:r>
+                <a:rPr lang="en-US" i="1" baseline="-25000" dirty="0" err="1"/>
+                <a:t>start</a:t>
+              </a:r>
+              <a:endParaRPr lang="en-DE" i="1" baseline="-25000" dirty="0"/>
+            </a:p>
+          </p:txBody>
+        </p:sp>
+        <p:sp>
+          <p:nvSpPr>
+            <p:cNvPr id="16" name="TextBox 15">
+              <a:extLst>
+                <a:ext uri="{FF2B5EF4-FFF2-40B4-BE49-F238E27FC236}">
+                  <a16:creationId xmlns:a16="http://schemas.microsoft.com/office/drawing/2014/main" id="{695518FB-F9AA-4AC5-9847-4CFF99A204DE}"/>
+                </a:ext>
+              </a:extLst>
+            </p:cNvPr>
+            <p:cNvSpPr txBox="1"/>
+            <p:nvPr/>
+          </p:nvSpPr>
+          <p:spPr>
+            <a:xfrm>
+              <a:off x="4695824" y="1219378"/>
+              <a:ext cx="925608" cy="369332"/>
+            </a:xfrm>
+            <a:prstGeom prst="rect">
+              <a:avLst/>
+            </a:prstGeom>
+            <a:noFill/>
+          </p:spPr>
+          <p:txBody>
+            <a:bodyPr wrap="square" rtlCol="0">
+              <a:spAutoFit/>
+            </a:bodyPr>
+            <a:lstStyle/>
+            <a:p>
+              <a:r>
+                <a:rPr lang="en-US" i="1" dirty="0"/>
+                <a:t>v</a:t>
+              </a:r>
+              <a:r>
+                <a:rPr lang="en-US" i="1" baseline="-25000" dirty="0"/>
+                <a:t>end</a:t>
+              </a:r>
+              <a:endParaRPr lang="en-DE" i="1" baseline="-25000" dirty="0"/>
+            </a:p>
+          </p:txBody>
+        </p:sp>
+        <p:sp>
+          <p:nvSpPr>
+            <p:cNvPr id="17" name="Rectangle 16">
+              <a:extLst>
+                <a:ext uri="{FF2B5EF4-FFF2-40B4-BE49-F238E27FC236}">
+                  <a16:creationId xmlns:a16="http://schemas.microsoft.com/office/drawing/2014/main" id="{959F5A7F-4BF6-4C5E-82F1-DED2C33998FA}"/>
+                </a:ext>
+              </a:extLst>
+            </p:cNvPr>
+            <p:cNvSpPr/>
+            <p:nvPr/>
+          </p:nvSpPr>
+          <p:spPr>
+            <a:xfrm>
+              <a:off x="1544445" y="3542265"/>
+              <a:ext cx="1054391" cy="369332"/>
+            </a:xfrm>
+            <a:prstGeom prst="rect">
+              <a:avLst/>
+            </a:prstGeom>
+          </p:spPr>
+          <p:txBody>
+            <a:bodyPr wrap="none">
+              <a:spAutoFit/>
+            </a:bodyPr>
+            <a:lstStyle/>
+            <a:p>
+              <a:r>
+                <a:rPr lang="en-US" i="1" dirty="0" err="1"/>
+                <a:t>F</a:t>
+              </a:r>
+              <a:r>
+                <a:rPr lang="en-US" i="1" baseline="-25000" dirty="0" err="1"/>
+                <a:t>rec</a:t>
+              </a:r>
+              <a:r>
+                <a:rPr lang="en-US" i="1" dirty="0"/>
+                <a:t>(start)</a:t>
+              </a:r>
+              <a:endParaRPr lang="en-DE" dirty="0"/>
+            </a:p>
+          </p:txBody>
+        </p:sp>
+        <p:sp>
+          <p:nvSpPr>
+            <p:cNvPr id="18" name="Rectangle 17">
+              <a:extLst>
+                <a:ext uri="{FF2B5EF4-FFF2-40B4-BE49-F238E27FC236}">
+                  <a16:creationId xmlns:a16="http://schemas.microsoft.com/office/drawing/2014/main" id="{61765821-7A19-49A4-BF5B-85B32470D9C8}"/>
+                </a:ext>
+              </a:extLst>
+            </p:cNvPr>
+            <p:cNvSpPr/>
+            <p:nvPr/>
+          </p:nvSpPr>
+          <p:spPr>
+            <a:xfrm>
+              <a:off x="1540484" y="2348456"/>
+              <a:ext cx="967124" cy="369332"/>
+            </a:xfrm>
+            <a:prstGeom prst="rect">
+              <a:avLst/>
+            </a:prstGeom>
+          </p:spPr>
+          <p:txBody>
+            <a:bodyPr wrap="none">
+              <a:spAutoFit/>
+            </a:bodyPr>
+            <a:lstStyle/>
+            <a:p>
+              <a:r>
+                <a:rPr lang="en-US" i="1" dirty="0" err="1"/>
+                <a:t>F</a:t>
+              </a:r>
+              <a:r>
+                <a:rPr lang="en-US" i="1" baseline="-25000" dirty="0" err="1"/>
+                <a:t>rec</a:t>
+              </a:r>
+              <a:r>
+                <a:rPr lang="en-US" i="1" dirty="0"/>
+                <a:t>(end)</a:t>
+              </a:r>
+              <a:endParaRPr lang="en-DE" dirty="0"/>
+            </a:p>
+          </p:txBody>
+        </p:sp>
+        <p:sp>
+          <p:nvSpPr>
+            <p:cNvPr id="19" name="Rectangle 18">
+              <a:extLst>
+                <a:ext uri="{FF2B5EF4-FFF2-40B4-BE49-F238E27FC236}">
+                  <a16:creationId xmlns:a16="http://schemas.microsoft.com/office/drawing/2014/main" id="{3E07C965-C50D-4349-A92B-75422A375AE3}"/>
+                </a:ext>
+              </a:extLst>
+            </p:cNvPr>
+            <p:cNvSpPr/>
+            <p:nvPr/>
+          </p:nvSpPr>
+          <p:spPr>
+            <a:xfrm>
+              <a:off x="3570176" y="1548028"/>
+              <a:ext cx="1058047" cy="369332"/>
+            </a:xfrm>
+            <a:prstGeom prst="rect">
+              <a:avLst/>
+            </a:prstGeom>
+          </p:spPr>
+          <p:txBody>
+            <a:bodyPr wrap="none">
+              <a:spAutoFit/>
+            </a:bodyPr>
+            <a:lstStyle/>
+            <a:p>
+              <a:r>
+                <a:rPr lang="en-US" i="1" dirty="0" err="1"/>
+                <a:t>F</a:t>
+              </a:r>
+              <a:r>
+                <a:rPr lang="en-US" i="1" baseline="-25000" dirty="0" err="1"/>
+                <a:t>emit</a:t>
+              </a:r>
+              <a:r>
+                <a:rPr lang="en-US" i="1" dirty="0"/>
+                <a:t>(end)</a:t>
+              </a:r>
+              <a:endParaRPr lang="en-DE" dirty="0"/>
+            </a:p>
+          </p:txBody>
+        </p:sp>
+        <p:sp>
+          <p:nvSpPr>
+            <p:cNvPr id="20" name="Rectangle 19">
+              <a:extLst>
+                <a:ext uri="{FF2B5EF4-FFF2-40B4-BE49-F238E27FC236}">
+                  <a16:creationId xmlns:a16="http://schemas.microsoft.com/office/drawing/2014/main" id="{4288A43F-F8C4-422F-BB1A-02CB066DA3AC}"/>
+                </a:ext>
+              </a:extLst>
+            </p:cNvPr>
+            <p:cNvSpPr/>
+            <p:nvPr/>
+          </p:nvSpPr>
+          <p:spPr>
+            <a:xfrm>
+              <a:off x="3571559" y="4504849"/>
+              <a:ext cx="1145314" cy="369332"/>
+            </a:xfrm>
+            <a:prstGeom prst="rect">
+              <a:avLst/>
+            </a:prstGeom>
+          </p:spPr>
+          <p:txBody>
+            <a:bodyPr wrap="none">
+              <a:spAutoFit/>
+            </a:bodyPr>
+            <a:lstStyle/>
+            <a:p>
+              <a:r>
+                <a:rPr lang="en-US" i="1" dirty="0" err="1"/>
+                <a:t>F</a:t>
+              </a:r>
+              <a:r>
+                <a:rPr lang="en-US" i="1" baseline="-25000" dirty="0" err="1"/>
+                <a:t>emit</a:t>
+              </a:r>
+              <a:r>
+                <a:rPr lang="en-US" i="1" dirty="0"/>
+                <a:t>(start)</a:t>
+              </a:r>
+              <a:endParaRPr lang="en-DE" dirty="0"/>
+            </a:p>
+          </p:txBody>
+        </p:sp>
+        <p:cxnSp>
+          <p:nvCxnSpPr>
+            <p:cNvPr id="22" name="Straight Connector 21">
+              <a:extLst>
+                <a:ext uri="{FF2B5EF4-FFF2-40B4-BE49-F238E27FC236}">
+                  <a16:creationId xmlns:a16="http://schemas.microsoft.com/office/drawing/2014/main" id="{4D20BD9C-6BE6-4F5D-B6F9-A8E954346FA5}"/>
+                </a:ext>
+              </a:extLst>
+            </p:cNvPr>
+            <p:cNvCxnSpPr/>
+            <p:nvPr/>
+          </p:nvCxnSpPr>
+          <p:spPr>
+            <a:xfrm>
+              <a:off x="2181225" y="3161241"/>
+              <a:ext cx="2514599" cy="0"/>
+            </a:xfrm>
+            <a:prstGeom prst="line">
+              <a:avLst/>
+            </a:prstGeom>
+          </p:spPr>
+          <p:style>
+            <a:lnRef idx="1">
+              <a:schemeClr val="accent1"/>
+            </a:lnRef>
+            <a:fillRef idx="0">
+              <a:schemeClr val="accent1"/>
+            </a:fillRef>
+            <a:effectRef idx="0">
+              <a:schemeClr val="accent1"/>
+            </a:effectRef>
+            <a:fontRef idx="minor">
+              <a:schemeClr val="tx1"/>
+            </a:fontRef>
+          </p:style>
+        </p:cxnSp>
+        <p:sp>
+          <p:nvSpPr>
+            <p:cNvPr id="24" name="Arc 23">
+              <a:extLst>
+                <a:ext uri="{FF2B5EF4-FFF2-40B4-BE49-F238E27FC236}">
+                  <a16:creationId xmlns:a16="http://schemas.microsoft.com/office/drawing/2014/main" id="{E4076A8C-732E-4A95-BBC6-8B3CACCD7FA7}"/>
+                </a:ext>
+              </a:extLst>
+            </p:cNvPr>
+            <p:cNvSpPr/>
+            <p:nvPr/>
+          </p:nvSpPr>
+          <p:spPr>
+            <a:xfrm rot="2754897">
+              <a:off x="1149036" y="2245349"/>
+              <a:ext cx="1826239" cy="1787051"/>
+            </a:xfrm>
+            <a:prstGeom prst="arc">
+              <a:avLst/>
+            </a:prstGeom>
+          </p:spPr>
+          <p:style>
+            <a:lnRef idx="1">
+              <a:schemeClr val="accent1"/>
+            </a:lnRef>
+            <a:fillRef idx="0">
+              <a:schemeClr val="accent1"/>
+            </a:fillRef>
+            <a:effectRef idx="0">
+              <a:schemeClr val="accent1"/>
+            </a:effectRef>
+            <a:fontRef idx="minor">
+              <a:schemeClr val="tx1"/>
+            </a:fontRef>
+          </p:style>
+          <p:txBody>
+            <a:bodyPr rtlCol="0" anchor="ctr"/>
+            <a:lstStyle/>
+            <a:p>
+              <a:pPr algn="ctr"/>
+              <a:endParaRPr lang="en-DE"/>
+            </a:p>
+          </p:txBody>
+        </p:sp>
+        <p:sp>
+          <p:nvSpPr>
+            <p:cNvPr id="25" name="TextBox 24">
+              <a:extLst>
+                <a:ext uri="{FF2B5EF4-FFF2-40B4-BE49-F238E27FC236}">
+                  <a16:creationId xmlns:a16="http://schemas.microsoft.com/office/drawing/2014/main" id="{F2121B29-3980-486E-A7F9-1C4431C35564}"/>
+                </a:ext>
+              </a:extLst>
+            </p:cNvPr>
+            <p:cNvSpPr txBox="1"/>
+            <p:nvPr/>
+          </p:nvSpPr>
+          <p:spPr>
+            <a:xfrm>
+              <a:off x="2937519" y="2869979"/>
+              <a:ext cx="917242" cy="369332"/>
+            </a:xfrm>
+            <a:prstGeom prst="rect">
+              <a:avLst/>
+            </a:prstGeom>
+            <a:noFill/>
+          </p:spPr>
+          <p:txBody>
+            <a:bodyPr wrap="square" rtlCol="0">
+              <a:spAutoFit/>
+            </a:bodyPr>
+            <a:lstStyle/>
+            <a:p>
+              <a:r>
+                <a:rPr lang="el-GR" dirty="0"/>
+                <a:t>θ</a:t>
+              </a:r>
+              <a:r>
+                <a:rPr lang="en-US" dirty="0"/>
+                <a:t>= 90</a:t>
+              </a:r>
+              <a:r>
+                <a:rPr lang="en-US" baseline="30000" dirty="0"/>
+                <a:t>o</a:t>
+              </a:r>
+              <a:endParaRPr lang="en-DE" baseline="30000" dirty="0"/>
+            </a:p>
+          </p:txBody>
+        </p:sp>
+        <p:sp>
+          <p:nvSpPr>
+            <p:cNvPr id="26" name="TextBox 25">
+              <a:extLst>
+                <a:ext uri="{FF2B5EF4-FFF2-40B4-BE49-F238E27FC236}">
+                  <a16:creationId xmlns:a16="http://schemas.microsoft.com/office/drawing/2014/main" id="{0B1319AC-DCB4-4965-BC21-CBBAF6B1C4F4}"/>
+                </a:ext>
+              </a:extLst>
+            </p:cNvPr>
+            <p:cNvSpPr txBox="1"/>
+            <p:nvPr/>
+          </p:nvSpPr>
+          <p:spPr>
+            <a:xfrm>
+              <a:off x="2691030" y="2311400"/>
+              <a:ext cx="917245" cy="369332"/>
+            </a:xfrm>
+            <a:prstGeom prst="rect">
+              <a:avLst/>
+            </a:prstGeom>
+            <a:noFill/>
+          </p:spPr>
+          <p:txBody>
+            <a:bodyPr wrap="square" rtlCol="0">
+              <a:spAutoFit/>
+            </a:bodyPr>
+            <a:lstStyle/>
+            <a:p>
+              <a:r>
+                <a:rPr lang="el-GR" dirty="0"/>
+                <a:t>θ</a:t>
+              </a:r>
+              <a:r>
+                <a:rPr lang="en-US" dirty="0"/>
+                <a:t>=135</a:t>
+              </a:r>
+              <a:r>
+                <a:rPr lang="en-US" baseline="30000" dirty="0"/>
+                <a:t>o</a:t>
+              </a:r>
+              <a:endParaRPr lang="en-DE" baseline="30000" dirty="0"/>
+            </a:p>
+          </p:txBody>
+        </p:sp>
+        <p:sp>
+          <p:nvSpPr>
+            <p:cNvPr id="27" name="TextBox 26">
+              <a:extLst>
+                <a:ext uri="{FF2B5EF4-FFF2-40B4-BE49-F238E27FC236}">
+                  <a16:creationId xmlns:a16="http://schemas.microsoft.com/office/drawing/2014/main" id="{3655BEA4-123A-4B2C-975D-F8E5177E455B}"/>
+                </a:ext>
+              </a:extLst>
+            </p:cNvPr>
+            <p:cNvSpPr txBox="1"/>
+            <p:nvPr/>
+          </p:nvSpPr>
+          <p:spPr>
+            <a:xfrm>
+              <a:off x="2732097" y="3621761"/>
+              <a:ext cx="965103" cy="369332"/>
+            </a:xfrm>
+            <a:prstGeom prst="rect">
+              <a:avLst/>
+            </a:prstGeom>
+            <a:noFill/>
+          </p:spPr>
+          <p:txBody>
+            <a:bodyPr wrap="square" rtlCol="0">
+              <a:spAutoFit/>
+            </a:bodyPr>
+            <a:lstStyle/>
+            <a:p>
+              <a:r>
+                <a:rPr lang="el-GR" dirty="0"/>
+                <a:t>θ</a:t>
+              </a:r>
+              <a:r>
+                <a:rPr lang="en-US" dirty="0"/>
+                <a:t>= 45</a:t>
+              </a:r>
+              <a:r>
+                <a:rPr lang="en-US" baseline="30000" dirty="0"/>
+                <a:t>o</a:t>
+              </a:r>
+              <a:endParaRPr lang="en-DE" baseline="30000" dirty="0"/>
+            </a:p>
+          </p:txBody>
+        </p:sp>
+        <p:grpSp>
+          <p:nvGrpSpPr>
+            <p:cNvPr id="35" name="Group 34">
+              <a:extLst>
+                <a:ext uri="{FF2B5EF4-FFF2-40B4-BE49-F238E27FC236}">
+                  <a16:creationId xmlns:a16="http://schemas.microsoft.com/office/drawing/2014/main" id="{4A10F2F6-3213-45F9-8564-9732A821227C}"/>
+                </a:ext>
+              </a:extLst>
+            </p:cNvPr>
+            <p:cNvGrpSpPr/>
+            <p:nvPr/>
+          </p:nvGrpSpPr>
+          <p:grpSpPr>
+            <a:xfrm>
+              <a:off x="4533899" y="3038474"/>
+              <a:ext cx="161925" cy="122767"/>
+              <a:chOff x="4524375" y="2893484"/>
+              <a:chExt cx="171449" cy="267757"/>
+            </a:xfrm>
+          </p:grpSpPr>
+          <p:cxnSp>
+            <p:nvCxnSpPr>
+              <p:cNvPr id="30" name="Straight Connector 29">
+                <a:extLst>
+                  <a:ext uri="{FF2B5EF4-FFF2-40B4-BE49-F238E27FC236}">
+                    <a16:creationId xmlns:a16="http://schemas.microsoft.com/office/drawing/2014/main" id="{7BF70930-714A-48F0-A493-9322F6DE61BB}"/>
+                  </a:ext>
+                </a:extLst>
+              </p:cNvPr>
+              <p:cNvCxnSpPr>
+                <a:cxnSpLocks/>
+              </p:cNvCxnSpPr>
+              <p:nvPr/>
+            </p:nvCxnSpPr>
+            <p:spPr>
+              <a:xfrm>
+                <a:off x="4524375" y="2893484"/>
+                <a:ext cx="0" cy="267757"/>
+              </a:xfrm>
+              <a:prstGeom prst="line">
+                <a:avLst/>
+              </a:prstGeom>
+            </p:spPr>
+            <p:style>
+              <a:lnRef idx="1">
+                <a:schemeClr val="accent1"/>
+              </a:lnRef>
+              <a:fillRef idx="0">
+                <a:schemeClr val="accent1"/>
+              </a:fillRef>
+              <a:effectRef idx="0">
+                <a:schemeClr val="accent1"/>
+              </a:effectRef>
+              <a:fontRef idx="minor">
+                <a:schemeClr val="tx1"/>
+              </a:fontRef>
+            </p:style>
+          </p:cxnSp>
+          <p:cxnSp>
+            <p:nvCxnSpPr>
+              <p:cNvPr id="32" name="Straight Connector 31">
+                <a:extLst>
+                  <a:ext uri="{FF2B5EF4-FFF2-40B4-BE49-F238E27FC236}">
+                    <a16:creationId xmlns:a16="http://schemas.microsoft.com/office/drawing/2014/main" id="{85271AA6-A68C-4590-B678-58A7C1617F28}"/>
+                  </a:ext>
+                </a:extLst>
+              </p:cNvPr>
+              <p:cNvCxnSpPr>
+                <a:cxnSpLocks/>
+              </p:cNvCxnSpPr>
+              <p:nvPr/>
+            </p:nvCxnSpPr>
+            <p:spPr>
+              <a:xfrm flipH="1">
+                <a:off x="4524375" y="2893484"/>
+                <a:ext cx="171449" cy="0"/>
+              </a:xfrm>
+              <a:prstGeom prst="line">
+                <a:avLst/>
+              </a:prstGeom>
+            </p:spPr>
+            <p:style>
+              <a:lnRef idx="1">
+                <a:schemeClr val="accent1"/>
+              </a:lnRef>
+              <a:fillRef idx="0">
+                <a:schemeClr val="accent1"/>
+              </a:fillRef>
+              <a:effectRef idx="0">
+                <a:schemeClr val="accent1"/>
+              </a:effectRef>
+              <a:fontRef idx="minor">
+                <a:schemeClr val="tx1"/>
+              </a:fontRef>
+            </p:style>
+          </p:cxnSp>
+        </p:grpSp>
+        <p:sp>
+          <p:nvSpPr>
+            <p:cNvPr id="36" name="Rectangle 35">
+              <a:extLst>
+                <a:ext uri="{FF2B5EF4-FFF2-40B4-BE49-F238E27FC236}">
+                  <a16:creationId xmlns:a16="http://schemas.microsoft.com/office/drawing/2014/main" id="{C8CC12B1-5C38-475A-8BA1-A789BAE0E7F9}"/>
+                </a:ext>
+              </a:extLst>
+            </p:cNvPr>
+            <p:cNvSpPr/>
+            <p:nvPr/>
+          </p:nvSpPr>
+          <p:spPr>
+            <a:xfrm>
+              <a:off x="5890462" y="3099857"/>
+              <a:ext cx="4111125" cy="523220"/>
+            </a:xfrm>
+            <a:prstGeom prst="rect">
+              <a:avLst/>
+            </a:prstGeom>
+          </p:spPr>
+          <p:txBody>
+            <a:bodyPr wrap="none">
+              <a:spAutoFit/>
+            </a:bodyPr>
+            <a:lstStyle/>
+            <a:p>
+              <a:r>
+                <a:rPr lang="en-US" sz="2800" i="1" dirty="0" err="1"/>
+                <a:t>F</a:t>
+              </a:r>
+              <a:r>
+                <a:rPr lang="en-US" sz="2800" i="1" baseline="-25000" dirty="0" err="1"/>
+                <a:t>rec</a:t>
+              </a:r>
+              <a:r>
+                <a:rPr lang="en-US" sz="2800" i="1" baseline="-25000" dirty="0"/>
+                <a:t> </a:t>
+              </a:r>
+              <a:r>
+                <a:rPr lang="en-US" sz="2800" i="1" dirty="0"/>
+                <a:t> = f(</a:t>
+              </a:r>
+              <a:r>
+                <a:rPr lang="en-US" sz="2800" i="1" dirty="0" err="1"/>
+                <a:t>F</a:t>
+              </a:r>
+              <a:r>
+                <a:rPr lang="en-US" sz="2800" i="1" baseline="-25000" dirty="0" err="1"/>
+                <a:t>emit</a:t>
+              </a:r>
+              <a:r>
+                <a:rPr lang="en-US" sz="2800" i="1" dirty="0"/>
+                <a:t>, flight angle, v)</a:t>
+              </a:r>
+              <a:endParaRPr lang="en-DE" sz="2800" dirty="0"/>
+            </a:p>
+          </p:txBody>
+        </p:sp>
+      </p:grpSp>
+    </p:spTree>
+    <p:extLst>
+      <p:ext uri="{BB962C8B-B14F-4D97-AF65-F5344CB8AC3E}">
+        <p14:creationId xmlns:p14="http://schemas.microsoft.com/office/powerpoint/2010/main" val="2856510653"/>
       </p:ext>
     </p:extLst>
   </p:cSld>

</xml_diff>

<commit_message>
implement SI changes from round 2 into combined MS
</commit_message>
<xml_diff>
--- a/hbc_paper/figures/schematics_hbcpaper.pptx
+++ b/hbc_paper/figures/schematics_hbcpaper.pptx
@@ -263,7 +263,7 @@
           <a:p>
             <a:fld id="{282298F1-C911-427F-A662-45721A4CC261}" type="datetimeFigureOut">
               <a:rPr lang="en-DE" smtClean="0"/>
-              <a:t>12/01/2021</a:t>
+              <a:t>17/01/2021</a:t>
             </a:fld>
             <a:endParaRPr lang="en-DE"/>
           </a:p>
@@ -463,7 +463,7 @@
           <a:p>
             <a:fld id="{282298F1-C911-427F-A662-45721A4CC261}" type="datetimeFigureOut">
               <a:rPr lang="en-DE" smtClean="0"/>
-              <a:t>12/01/2021</a:t>
+              <a:t>17/01/2021</a:t>
             </a:fld>
             <a:endParaRPr lang="en-DE"/>
           </a:p>
@@ -673,7 +673,7 @@
           <a:p>
             <a:fld id="{282298F1-C911-427F-A662-45721A4CC261}" type="datetimeFigureOut">
               <a:rPr lang="en-DE" smtClean="0"/>
-              <a:t>12/01/2021</a:t>
+              <a:t>17/01/2021</a:t>
             </a:fld>
             <a:endParaRPr lang="en-DE"/>
           </a:p>
@@ -873,7 +873,7 @@
           <a:p>
             <a:fld id="{282298F1-C911-427F-A662-45721A4CC261}" type="datetimeFigureOut">
               <a:rPr lang="en-DE" smtClean="0"/>
-              <a:t>12/01/2021</a:t>
+              <a:t>17/01/2021</a:t>
             </a:fld>
             <a:endParaRPr lang="en-DE"/>
           </a:p>
@@ -1149,7 +1149,7 @@
           <a:p>
             <a:fld id="{282298F1-C911-427F-A662-45721A4CC261}" type="datetimeFigureOut">
               <a:rPr lang="en-DE" smtClean="0"/>
-              <a:t>12/01/2021</a:t>
+              <a:t>17/01/2021</a:t>
             </a:fld>
             <a:endParaRPr lang="en-DE"/>
           </a:p>
@@ -1417,7 +1417,7 @@
           <a:p>
             <a:fld id="{282298F1-C911-427F-A662-45721A4CC261}" type="datetimeFigureOut">
               <a:rPr lang="en-DE" smtClean="0"/>
-              <a:t>12/01/2021</a:t>
+              <a:t>17/01/2021</a:t>
             </a:fld>
             <a:endParaRPr lang="en-DE"/>
           </a:p>
@@ -1832,7 +1832,7 @@
           <a:p>
             <a:fld id="{282298F1-C911-427F-A662-45721A4CC261}" type="datetimeFigureOut">
               <a:rPr lang="en-DE" smtClean="0"/>
-              <a:t>12/01/2021</a:t>
+              <a:t>17/01/2021</a:t>
             </a:fld>
             <a:endParaRPr lang="en-DE"/>
           </a:p>
@@ -1974,7 +1974,7 @@
           <a:p>
             <a:fld id="{282298F1-C911-427F-A662-45721A4CC261}" type="datetimeFigureOut">
               <a:rPr lang="en-DE" smtClean="0"/>
-              <a:t>12/01/2021</a:t>
+              <a:t>17/01/2021</a:t>
             </a:fld>
             <a:endParaRPr lang="en-DE"/>
           </a:p>
@@ -2087,7 +2087,7 @@
           <a:p>
             <a:fld id="{282298F1-C911-427F-A662-45721A4CC261}" type="datetimeFigureOut">
               <a:rPr lang="en-DE" smtClean="0"/>
-              <a:t>12/01/2021</a:t>
+              <a:t>17/01/2021</a:t>
             </a:fld>
             <a:endParaRPr lang="en-DE"/>
           </a:p>
@@ -2400,7 +2400,7 @@
           <a:p>
             <a:fld id="{282298F1-C911-427F-A662-45721A4CC261}" type="datetimeFigureOut">
               <a:rPr lang="en-DE" smtClean="0"/>
-              <a:t>12/01/2021</a:t>
+              <a:t>17/01/2021</a:t>
             </a:fld>
             <a:endParaRPr lang="en-DE"/>
           </a:p>
@@ -2689,7 +2689,7 @@
           <a:p>
             <a:fld id="{282298F1-C911-427F-A662-45721A4CC261}" type="datetimeFigureOut">
               <a:rPr lang="en-DE" smtClean="0"/>
-              <a:t>12/01/2021</a:t>
+              <a:t>17/01/2021</a:t>
             </a:fld>
             <a:endParaRPr lang="en-DE"/>
           </a:p>
@@ -2932,7 +2932,7 @@
           <a:p>
             <a:fld id="{282298F1-C911-427F-A662-45721A4CC261}" type="datetimeFigureOut">
               <a:rPr lang="en-DE" smtClean="0"/>
-              <a:t>12/01/2021</a:t>
+              <a:t>17/01/2021</a:t>
             </a:fld>
             <a:endParaRPr lang="en-DE"/>
           </a:p>
@@ -5266,10 +5266,10 @@
         </p:nvGrpSpPr>
         <p:grpSpPr>
           <a:xfrm>
-            <a:off x="0" y="-1"/>
-            <a:ext cx="8436868" cy="3542805"/>
-            <a:chOff x="0" y="-1"/>
-            <a:chExt cx="8436868" cy="3542805"/>
+            <a:off x="0" y="-6707"/>
+            <a:ext cx="8101609" cy="3549511"/>
+            <a:chOff x="0" y="-6707"/>
+            <a:chExt cx="8101609" cy="3549511"/>
           </a:xfrm>
         </p:grpSpPr>
         <p:pic>
@@ -5794,7 +5794,7 @@
           </p:nvSpPr>
           <p:spPr>
             <a:xfrm>
-              <a:off x="3627029" y="-1"/>
+              <a:off x="0" y="-6706"/>
               <a:ext cx="595618" cy="377505"/>
             </a:xfrm>
             <a:prstGeom prst="rect">
@@ -5838,7 +5838,7 @@
           </p:nvSpPr>
           <p:spPr>
             <a:xfrm>
-              <a:off x="7841250" y="0"/>
+              <a:off x="3978085" y="-6707"/>
               <a:ext cx="595618" cy="377505"/>
             </a:xfrm>
             <a:prstGeom prst="rect">

</xml_diff>